<commit_message>
traducao dos arquivos readme
</commit_message>
<xml_diff>
--- a/python-for-beginners/Slides/2 - Print.pptx
+++ b/python-for-beginners/Slides/2 - Print.pptx
@@ -644,7 +644,7 @@
               <a:rPr lang="en-US" smtClean="0">
                 <a:latin typeface="Segoe UI" pitchFamily="34" charset="0"/>
               </a:rPr>
-              <a:t>6/17/2019 10:31 AM</a:t>
+              <a:t>7/17/2020 5:02 PM</a:t>
             </a:fld>
             <a:endParaRPr lang="en-US" dirty="0">
               <a:latin typeface="Segoe UI" pitchFamily="34" charset="0"/>
@@ -922,7 +922,7 @@
           <a:p>
             <a:fld id="{38EEC551-8CDA-4EB6-89BB-2A86C9F091C8}" type="datetime8">
               <a:rPr lang="en-US" smtClean="0"/>
-              <a:t>6/17/2019 10:31 AM</a:t>
+              <a:t>7/17/2020 5:02 PM</a:t>
             </a:fld>
             <a:endParaRPr lang="en-US" dirty="0"/>
           </a:p>
@@ -1256,7 +1256,7 @@
           <a:p>
             <a:fld id="{6108602D-D426-4C00-B215-BFA18C076426}" type="datetime8">
               <a:rPr lang="en-US" smtClean="0"/>
-              <a:t>6/17/2019 10:31 AM</a:t>
+              <a:t>7/17/2020 5:02 PM</a:t>
             </a:fld>
             <a:endParaRPr lang="en-US" dirty="0"/>
           </a:p>
@@ -1421,7 +1421,7 @@
           <a:p>
             <a:fld id="{6108602D-D426-4C00-B215-BFA18C076426}" type="datetime8">
               <a:rPr lang="en-US" smtClean="0"/>
-              <a:t>6/17/2019 10:31 AM</a:t>
+              <a:t>7/17/2020 5:04 PM</a:t>
             </a:fld>
             <a:endParaRPr lang="en-US" dirty="0"/>
           </a:p>
@@ -1586,7 +1586,7 @@
           <a:p>
             <a:fld id="{6108602D-D426-4C00-B215-BFA18C076426}" type="datetime8">
               <a:rPr lang="en-US" smtClean="0"/>
-              <a:t>6/17/2019 10:31 AM</a:t>
+              <a:t>7/17/2020 5:05 PM</a:t>
             </a:fld>
             <a:endParaRPr lang="en-US" dirty="0"/>
           </a:p>
@@ -1751,7 +1751,7 @@
           <a:p>
             <a:fld id="{6108602D-D426-4C00-B215-BFA18C076426}" type="datetime8">
               <a:rPr lang="en-US" smtClean="0"/>
-              <a:t>6/17/2019 10:31 AM</a:t>
+              <a:t>7/17/2020 5:08 PM</a:t>
             </a:fld>
             <a:endParaRPr lang="en-US" dirty="0"/>
           </a:p>
@@ -1916,7 +1916,7 @@
           <a:p>
             <a:fld id="{6108602D-D426-4C00-B215-BFA18C076426}" type="datetime8">
               <a:rPr lang="en-US" smtClean="0"/>
-              <a:t>6/17/2019 10:31 AM</a:t>
+              <a:t>7/17/2020 5:09 PM</a:t>
             </a:fld>
             <a:endParaRPr lang="en-US" dirty="0"/>
           </a:p>
@@ -40279,8 +40279,13 @@
           <a:p>
             <a:r>
               <a:rPr lang="en-US" b="1" dirty="0"/>
-              <a:t>print displays output to your console</a:t>
+              <a:t>print </a:t>
             </a:r>
+            <a:r>
+              <a:rPr lang="pt-BR" b="1" dirty="0"/>
+              <a:t>exibe uma saída para seu console</a:t>
+            </a:r>
+            <a:endParaRPr lang="en-US" b="1" dirty="0"/>
           </a:p>
         </p:txBody>
       </p:sp>
@@ -40314,7 +40319,39 @@
                   <a:srgbClr val="C00000"/>
                 </a:solidFill>
               </a:rPr>
-              <a:t>'Hello world'</a:t>
+              <a:t>‘</a:t>
+            </a:r>
+            <a:r>
+              <a:rPr lang="en-CA" dirty="0" err="1">
+                <a:solidFill>
+                  <a:srgbClr val="C00000"/>
+                </a:solidFill>
+              </a:rPr>
+              <a:t>Olá</a:t>
+            </a:r>
+            <a:r>
+              <a:rPr lang="en-CA" dirty="0">
+                <a:solidFill>
+                  <a:srgbClr val="C00000"/>
+                </a:solidFill>
+              </a:rPr>
+              <a:t> </a:t>
+            </a:r>
+            <a:r>
+              <a:rPr lang="en-CA" dirty="0" err="1">
+                <a:solidFill>
+                  <a:srgbClr val="C00000"/>
+                </a:solidFill>
+              </a:rPr>
+              <a:t>mundo</a:t>
+            </a:r>
+            <a:r>
+              <a:rPr lang="en-CA" dirty="0">
+                <a:solidFill>
+                  <a:srgbClr val="C00000"/>
+                </a:solidFill>
+              </a:rPr>
+              <a:t>!'</a:t>
             </a:r>
             <a:r>
               <a:rPr lang="en-CA" dirty="0">
@@ -40581,12 +40618,36 @@
           </a:lstStyle>
           <a:p>
             <a:r>
+              <a:rPr lang="en-CA" dirty="0" err="1">
+                <a:solidFill>
+                  <a:schemeClr val="bg1"/>
+                </a:solidFill>
+              </a:rPr>
+              <a:t>Olá</a:t>
+            </a:r>
+            <a:r>
               <a:rPr lang="en-CA" dirty="0">
                 <a:solidFill>
                   <a:schemeClr val="bg1"/>
                 </a:solidFill>
               </a:rPr>
-              <a:t>Hello world</a:t>
+              <a:t> </a:t>
+            </a:r>
+            <a:r>
+              <a:rPr lang="en-CA" dirty="0" err="1">
+                <a:solidFill>
+                  <a:schemeClr val="bg1"/>
+                </a:solidFill>
+              </a:rPr>
+              <a:t>mundo</a:t>
+            </a:r>
+            <a:r>
+              <a:rPr lang="en-CA" dirty="0">
+                <a:solidFill>
+                  <a:schemeClr val="bg1"/>
+                </a:solidFill>
+              </a:rPr>
+              <a:t>!</a:t>
             </a:r>
           </a:p>
           <a:p>
@@ -40733,7 +40794,27 @@
           <a:p>
             <a:r>
               <a:rPr lang="en-US" b="1" dirty="0"/>
-              <a:t>Enclose strings in single or double quotes</a:t>
+              <a:t>Use </a:t>
+            </a:r>
+            <a:r>
+              <a:rPr lang="en-US" b="1" dirty="0" err="1"/>
+              <a:t>aspas</a:t>
+            </a:r>
+            <a:r>
+              <a:rPr lang="en-US" b="1" dirty="0"/>
+              <a:t> simples </a:t>
+            </a:r>
+            <a:r>
+              <a:rPr lang="en-US" b="1" dirty="0" err="1"/>
+              <a:t>ou</a:t>
+            </a:r>
+            <a:r>
+              <a:rPr lang="en-US" b="1" dirty="0"/>
+              <a:t> </a:t>
+            </a:r>
+            <a:r>
+              <a:rPr lang="en-US" b="1" dirty="0" err="1"/>
+              <a:t>duplas</a:t>
             </a:r>
             <a:endParaRPr lang="en-US" dirty="0"/>
           </a:p>
@@ -40769,7 +40850,55 @@
                   <a:srgbClr val="C00000"/>
                 </a:solidFill>
               </a:rPr>
-              <a:t>'Hello world single quotes'</a:t>
+              <a:t>‘</a:t>
+            </a:r>
+            <a:r>
+              <a:rPr lang="en-US" dirty="0" err="1">
+                <a:solidFill>
+                  <a:srgbClr val="C00000"/>
+                </a:solidFill>
+              </a:rPr>
+              <a:t>Olá</a:t>
+            </a:r>
+            <a:r>
+              <a:rPr lang="en-US" dirty="0">
+                <a:solidFill>
+                  <a:srgbClr val="C00000"/>
+                </a:solidFill>
+              </a:rPr>
+              <a:t> </a:t>
+            </a:r>
+            <a:r>
+              <a:rPr lang="en-US" dirty="0" err="1">
+                <a:solidFill>
+                  <a:srgbClr val="C00000"/>
+                </a:solidFill>
+              </a:rPr>
+              <a:t>mundo</a:t>
+            </a:r>
+            <a:r>
+              <a:rPr lang="en-US" dirty="0">
+                <a:solidFill>
+                  <a:srgbClr val="C00000"/>
+                </a:solidFill>
+              </a:rPr>
+              <a:t> com </a:t>
+            </a:r>
+            <a:r>
+              <a:rPr lang="en-US" dirty="0" err="1">
+                <a:solidFill>
+                  <a:srgbClr val="C00000"/>
+                </a:solidFill>
+              </a:rPr>
+              <a:t>aspas</a:t>
+            </a:r>
+            <a:r>
+              <a:rPr lang="en-US" dirty="0">
+                <a:solidFill>
+                  <a:srgbClr val="C00000"/>
+                </a:solidFill>
+              </a:rPr>
+              <a:t> simples'</a:t>
             </a:r>
             <a:r>
               <a:rPr lang="en-US" dirty="0">
@@ -40799,7 +40928,71 @@
                   <a:srgbClr val="C00000"/>
                 </a:solidFill>
               </a:rPr>
-              <a:t>"Hello world double quotes"</a:t>
+              <a:t>" </a:t>
+            </a:r>
+            <a:r>
+              <a:rPr lang="en-US" dirty="0" err="1">
+                <a:solidFill>
+                  <a:srgbClr val="C00000"/>
+                </a:solidFill>
+              </a:rPr>
+              <a:t>Olá</a:t>
+            </a:r>
+            <a:r>
+              <a:rPr lang="en-US" dirty="0">
+                <a:solidFill>
+                  <a:srgbClr val="C00000"/>
+                </a:solidFill>
+              </a:rPr>
+              <a:t> </a:t>
+            </a:r>
+            <a:r>
+              <a:rPr lang="en-US" dirty="0" err="1">
+                <a:solidFill>
+                  <a:srgbClr val="C00000"/>
+                </a:solidFill>
+              </a:rPr>
+              <a:t>mundo</a:t>
+            </a:r>
+            <a:r>
+              <a:rPr lang="en-US" dirty="0">
+                <a:solidFill>
+                  <a:srgbClr val="C00000"/>
+                </a:solidFill>
+              </a:rPr>
+              <a:t> com </a:t>
+            </a:r>
+            <a:r>
+              <a:rPr lang="en-US" dirty="0" err="1">
+                <a:solidFill>
+                  <a:srgbClr val="C00000"/>
+                </a:solidFill>
+              </a:rPr>
+              <a:t>aspas</a:t>
+            </a:r>
+            <a:r>
+              <a:rPr lang="en-US" dirty="0">
+                <a:solidFill>
+                  <a:srgbClr val="C00000"/>
+                </a:solidFill>
+              </a:rPr>
+              <a:t> </a:t>
+            </a:r>
+            <a:r>
+              <a:rPr lang="en-US" dirty="0" err="1">
+                <a:solidFill>
+                  <a:srgbClr val="C00000"/>
+                </a:solidFill>
+              </a:rPr>
+              <a:t>duplas</a:t>
+            </a:r>
+            <a:r>
+              <a:rPr lang="en-US" dirty="0">
+                <a:solidFill>
+                  <a:srgbClr val="C00000"/>
+                </a:solidFill>
+              </a:rPr>
+              <a:t>"</a:t>
             </a:r>
             <a:r>
               <a:rPr lang="en-US" dirty="0">
@@ -41066,22 +41259,110 @@
           </a:lstStyle>
           <a:p>
             <a:r>
-              <a:rPr lang="en-CA" dirty="0">
+              <a:rPr lang="en-CA" dirty="0" err="1">
                 <a:solidFill>
                   <a:schemeClr val="bg1"/>
                 </a:solidFill>
               </a:rPr>
-              <a:t>Hello world single quotes</a:t>
+              <a:t>Olá</a:t>
             </a:r>
-          </a:p>
-          <a:p>
             <a:r>
               <a:rPr lang="en-CA" dirty="0">
                 <a:solidFill>
                   <a:schemeClr val="bg1"/>
                 </a:solidFill>
               </a:rPr>
-              <a:t>Hello world double quotes</a:t>
+              <a:t> </a:t>
+            </a:r>
+            <a:r>
+              <a:rPr lang="en-CA" dirty="0" err="1">
+                <a:solidFill>
+                  <a:schemeClr val="bg1"/>
+                </a:solidFill>
+              </a:rPr>
+              <a:t>mundo</a:t>
+            </a:r>
+            <a:r>
+              <a:rPr lang="en-CA" dirty="0">
+                <a:solidFill>
+                  <a:schemeClr val="bg1"/>
+                </a:solidFill>
+              </a:rPr>
+              <a:t> com </a:t>
+            </a:r>
+            <a:r>
+              <a:rPr lang="en-CA" dirty="0" err="1">
+                <a:solidFill>
+                  <a:schemeClr val="bg1"/>
+                </a:solidFill>
+              </a:rPr>
+              <a:t>aspas</a:t>
+            </a:r>
+            <a:r>
+              <a:rPr lang="en-CA" dirty="0">
+                <a:solidFill>
+                  <a:schemeClr val="bg1"/>
+                </a:solidFill>
+              </a:rPr>
+              <a:t> simples</a:t>
+            </a:r>
+          </a:p>
+          <a:p>
+            <a:r>
+              <a:rPr lang="en-CA" dirty="0" err="1">
+                <a:solidFill>
+                  <a:schemeClr val="bg1"/>
+                </a:solidFill>
+              </a:rPr>
+              <a:t>Olá</a:t>
+            </a:r>
+            <a:r>
+              <a:rPr lang="en-CA" dirty="0">
+                <a:solidFill>
+                  <a:schemeClr val="bg1"/>
+                </a:solidFill>
+              </a:rPr>
+              <a:t> </a:t>
+            </a:r>
+            <a:r>
+              <a:rPr lang="en-CA" dirty="0" err="1">
+                <a:solidFill>
+                  <a:schemeClr val="bg1"/>
+                </a:solidFill>
+              </a:rPr>
+              <a:t>mundo</a:t>
+            </a:r>
+            <a:r>
+              <a:rPr lang="en-CA" dirty="0">
+                <a:solidFill>
+                  <a:schemeClr val="bg1"/>
+                </a:solidFill>
+              </a:rPr>
+              <a:t> com </a:t>
+            </a:r>
+            <a:r>
+              <a:rPr lang="en-CA" dirty="0" err="1">
+                <a:solidFill>
+                  <a:schemeClr val="bg1"/>
+                </a:solidFill>
+              </a:rPr>
+              <a:t>aspas</a:t>
+            </a:r>
+            <a:r>
+              <a:rPr lang="en-CA" dirty="0">
+                <a:solidFill>
+                  <a:schemeClr val="bg1"/>
+                </a:solidFill>
+              </a:rPr>
+              <a:t> </a:t>
+            </a:r>
+            <a:r>
+              <a:rPr lang="en-CA" dirty="0" err="1">
+                <a:solidFill>
+                  <a:schemeClr val="bg1"/>
+                </a:solidFill>
+              </a:rPr>
+              <a:t>duplas</a:t>
             </a:r>
             <a:endParaRPr lang="en-CA" dirty="0"/>
           </a:p>
@@ -41225,8 +41506,24 @@
           <a:lstStyle/>
           <a:p>
             <a:r>
+              <a:rPr lang="en-US" b="1" dirty="0" err="1"/>
+              <a:t>Obter</a:t>
+            </a:r>
+            <a:r>
               <a:rPr lang="en-US" b="1" dirty="0"/>
-              <a:t>Getting information from the user</a:t>
+              <a:t> </a:t>
+            </a:r>
+            <a:r>
+              <a:rPr lang="en-US" b="1" dirty="0" err="1"/>
+              <a:t>informação</a:t>
+            </a:r>
+            <a:r>
+              <a:rPr lang="en-US" b="1" dirty="0"/>
+              <a:t> do </a:t>
+            </a:r>
+            <a:r>
+              <a:rPr lang="en-US" b="1" dirty="0" err="1"/>
+              <a:t>usuário</a:t>
             </a:r>
             <a:endParaRPr lang="en-US" dirty="0"/>
           </a:p>
@@ -41262,7 +41559,55 @@
                   <a:srgbClr val="C00000"/>
                 </a:solidFill>
               </a:rPr>
-              <a:t>'Please enter your name: '</a:t>
+              <a:t>‘Por favor, </a:t>
+            </a:r>
+            <a:r>
+              <a:rPr lang="en-US" dirty="0" err="1">
+                <a:solidFill>
+                  <a:srgbClr val="C00000"/>
+                </a:solidFill>
+              </a:rPr>
+              <a:t>informe</a:t>
+            </a:r>
+            <a:r>
+              <a:rPr lang="en-US" dirty="0">
+                <a:solidFill>
+                  <a:srgbClr val="C00000"/>
+                </a:solidFill>
+              </a:rPr>
+              <a:t> o </a:t>
+            </a:r>
+            <a:r>
+              <a:rPr lang="en-US" dirty="0" err="1">
+                <a:solidFill>
+                  <a:srgbClr val="C00000"/>
+                </a:solidFill>
+              </a:rPr>
+              <a:t>seu</a:t>
+            </a:r>
+            <a:r>
+              <a:rPr lang="en-US" dirty="0">
+                <a:solidFill>
+                  <a:srgbClr val="C00000"/>
+                </a:solidFill>
+              </a:rPr>
+              <a:t> </a:t>
+            </a:r>
+            <a:r>
+              <a:rPr lang="en-US" dirty="0" err="1">
+                <a:solidFill>
+                  <a:srgbClr val="C00000"/>
+                </a:solidFill>
+              </a:rPr>
+              <a:t>nome</a:t>
+            </a:r>
+            <a:r>
+              <a:rPr lang="en-US" dirty="0">
+                <a:solidFill>
+                  <a:srgbClr val="C00000"/>
+                </a:solidFill>
+              </a:rPr>
+              <a:t>: '</a:t>
             </a:r>
             <a:r>
               <a:rPr lang="en-US" dirty="0"/>
@@ -41539,12 +41884,20 @@
           </a:lstStyle>
           <a:p>
             <a:r>
+              <a:rPr lang="pt-BR" dirty="0">
+                <a:solidFill>
+                  <a:schemeClr val="bg1"/>
+                </a:solidFill>
+              </a:rPr>
+              <a:t>Por favor, informe o seu nome</a:t>
+            </a:r>
+            <a:r>
               <a:rPr lang="en-US" dirty="0">
                 <a:solidFill>
                   <a:schemeClr val="bg1"/>
                 </a:solidFill>
               </a:rPr>
-              <a:t>Please enter your name: Susan</a:t>
+              <a:t>: Susan</a:t>
             </a:r>
             <a:endParaRPr lang="en-CA" dirty="0">
               <a:solidFill>
@@ -41698,12 +42051,14 @@
         </p:nvSpPr>
         <p:spPr/>
         <p:txBody>
-          <a:bodyPr/>
+          <a:bodyPr>
+            <a:normAutofit fontScale="90000"/>
+          </a:bodyPr>
           <a:lstStyle/>
           <a:p>
             <a:r>
-              <a:rPr lang="en-US" b="1" dirty="0"/>
-              <a:t>Printing blank lines can improve readability</a:t>
+              <a:rPr lang="pt-BR" b="1" dirty="0"/>
+              <a:t>Imprimir linhas em branco pode melhorar a legibilidade</a:t>
             </a:r>
             <a:endParaRPr lang="en-US" dirty="0"/>
           </a:p>
@@ -41721,7 +42076,7 @@
         </p:nvSpPr>
         <p:spPr>
           <a:xfrm>
-            <a:off x="365760" y="1371600"/>
+            <a:off x="365760" y="1787366"/>
             <a:ext cx="11704320" cy="2708434"/>
           </a:xfrm>
         </p:spPr>
@@ -41739,7 +42094,39 @@
                   <a:srgbClr val="C00000"/>
                 </a:solidFill>
               </a:rPr>
-              <a:t>'Hello world'</a:t>
+              <a:t>‘</a:t>
+            </a:r>
+            <a:r>
+              <a:rPr lang="en-US" dirty="0" err="1">
+                <a:solidFill>
+                  <a:srgbClr val="C00000"/>
+                </a:solidFill>
+              </a:rPr>
+              <a:t>Olá</a:t>
+            </a:r>
+            <a:r>
+              <a:rPr lang="en-US" dirty="0">
+                <a:solidFill>
+                  <a:srgbClr val="C00000"/>
+                </a:solidFill>
+              </a:rPr>
+              <a:t> </a:t>
+            </a:r>
+            <a:r>
+              <a:rPr lang="en-US" dirty="0" err="1">
+                <a:solidFill>
+                  <a:srgbClr val="C00000"/>
+                </a:solidFill>
+              </a:rPr>
+              <a:t>mundo</a:t>
+            </a:r>
+            <a:r>
+              <a:rPr lang="en-US" dirty="0">
+                <a:solidFill>
+                  <a:srgbClr val="C00000"/>
+                </a:solidFill>
+              </a:rPr>
+              <a:t>'</a:t>
             </a:r>
             <a:r>
               <a:rPr lang="en-US" dirty="0">
@@ -41771,7 +42158,23 @@
                   <a:srgbClr val="C00000"/>
                 </a:solidFill>
               </a:rPr>
-              <a:t>'Did you see that blank line?'</a:t>
+              <a:t>'</a:t>
+            </a:r>
+            <a:r>
+              <a:rPr lang="pt-BR" dirty="0">
+                <a:solidFill>
+                  <a:srgbClr val="C00000"/>
+                </a:solidFill>
+              </a:rPr>
+              <a:t>Você viu essa linha em branco</a:t>
+            </a:r>
+            <a:r>
+              <a:rPr lang="en-US" dirty="0">
+                <a:solidFill>
+                  <a:srgbClr val="C00000"/>
+                </a:solidFill>
+              </a:rPr>
+              <a:t>?'</a:t>
             </a:r>
             <a:r>
               <a:rPr lang="en-US" dirty="0">
@@ -41793,7 +42196,39 @@
                   <a:srgbClr val="C00000"/>
                 </a:solidFill>
               </a:rPr>
-              <a:t>'Blank line </a:t>
+              <a:t>‘</a:t>
+            </a:r>
+            <a:r>
+              <a:rPr lang="en-US" dirty="0" err="1">
+                <a:solidFill>
+                  <a:srgbClr val="C00000"/>
+                </a:solidFill>
+              </a:rPr>
+              <a:t>Linha</a:t>
+            </a:r>
+            <a:r>
+              <a:rPr lang="en-US" dirty="0">
+                <a:solidFill>
+                  <a:srgbClr val="C00000"/>
+                </a:solidFill>
+              </a:rPr>
+              <a:t> em </a:t>
+            </a:r>
+            <a:r>
+              <a:rPr lang="en-US" dirty="0" err="1">
+                <a:solidFill>
+                  <a:srgbClr val="C00000"/>
+                </a:solidFill>
+              </a:rPr>
+              <a:t>branco</a:t>
+            </a:r>
+            <a:r>
+              <a:rPr lang="en-US" dirty="0">
+                <a:solidFill>
+                  <a:srgbClr val="C00000"/>
+                </a:solidFill>
+              </a:rPr>
+              <a:t> </a:t>
             </a:r>
             <a:r>
               <a:rPr lang="en-US" dirty="0">
@@ -41823,7 +42258,7 @@
                   <a:srgbClr val="C00000"/>
                 </a:solidFill>
               </a:rPr>
-              <a:t>in</a:t>
+              <a:t>no</a:t>
             </a:r>
             <a:r>
               <a:rPr lang="en-US" dirty="0">
@@ -41831,7 +42266,39 @@
                   <a:srgbClr val="C00000"/>
                 </a:solidFill>
               </a:rPr>
-              <a:t> the middle of string'</a:t>
+              <a:t> </a:t>
+            </a:r>
+            <a:r>
+              <a:rPr lang="en-US" dirty="0" err="1">
+                <a:solidFill>
+                  <a:srgbClr val="C00000"/>
+                </a:solidFill>
+              </a:rPr>
+              <a:t>meio</a:t>
+            </a:r>
+            <a:r>
+              <a:rPr lang="en-US" dirty="0">
+                <a:solidFill>
+                  <a:srgbClr val="C00000"/>
+                </a:solidFill>
+              </a:rPr>
+              <a:t> de </a:t>
+            </a:r>
+            <a:r>
+              <a:rPr lang="en-US" dirty="0" err="1">
+                <a:solidFill>
+                  <a:srgbClr val="C00000"/>
+                </a:solidFill>
+              </a:rPr>
+              <a:t>uma</a:t>
+            </a:r>
+            <a:r>
+              <a:rPr lang="en-US" dirty="0">
+                <a:solidFill>
+                  <a:srgbClr val="C00000"/>
+                </a:solidFill>
+              </a:rPr>
+              <a:t> string'</a:t>
             </a:r>
             <a:r>
               <a:rPr lang="en-US" dirty="0">
@@ -41868,7 +42335,7 @@
         </p:nvSpPr>
         <p:spPr>
           <a:xfrm>
-            <a:off x="365760" y="3725862"/>
+            <a:off x="365760" y="4141628"/>
             <a:ext cx="11704320" cy="2708434"/>
           </a:xfrm>
           <a:prstGeom prst="rect">
@@ -42106,15 +42573,149 @@
           </a:lstStyle>
           <a:p>
             <a:r>
+              <a:rPr lang="en-US" dirty="0" err="1">
+                <a:solidFill>
+                  <a:schemeClr val="bg1"/>
+                </a:solidFill>
+              </a:rPr>
+              <a:t>Olá</a:t>
+            </a:r>
+            <a:r>
               <a:rPr lang="en-US" dirty="0">
                 <a:solidFill>
                   <a:schemeClr val="bg1"/>
                 </a:solidFill>
               </a:rPr>
-              <a:t>Hello world</a:t>
+              <a:t> </a:t>
+            </a:r>
+            <a:r>
+              <a:rPr lang="en-US" dirty="0" err="1">
+                <a:solidFill>
+                  <a:schemeClr val="bg1"/>
+                </a:solidFill>
+              </a:rPr>
+              <a:t>mundo</a:t>
+            </a:r>
+            <a:endParaRPr lang="en-US" dirty="0">
+              <a:solidFill>
+                <a:schemeClr val="bg1"/>
+              </a:solidFill>
+            </a:endParaRPr>
+          </a:p>
+          <a:p>
+            <a:endParaRPr lang="en-US" dirty="0">
+              <a:solidFill>
+                <a:schemeClr val="bg1"/>
+              </a:solidFill>
+            </a:endParaRPr>
+          </a:p>
+          <a:p>
+            <a:r>
+              <a:rPr lang="en-US" dirty="0" err="1">
+                <a:solidFill>
+                  <a:schemeClr val="bg1"/>
+                </a:solidFill>
+              </a:rPr>
+              <a:t>Você</a:t>
+            </a:r>
+            <a:r>
+              <a:rPr lang="en-US" dirty="0">
+                <a:solidFill>
+                  <a:schemeClr val="bg1"/>
+                </a:solidFill>
+              </a:rPr>
+              <a:t> </a:t>
+            </a:r>
+            <a:r>
+              <a:rPr lang="en-US" dirty="0" err="1">
+                <a:solidFill>
+                  <a:schemeClr val="bg1"/>
+                </a:solidFill>
+              </a:rPr>
+              <a:t>viu</a:t>
+            </a:r>
+            <a:r>
+              <a:rPr lang="en-US" dirty="0">
+                <a:solidFill>
+                  <a:schemeClr val="bg1"/>
+                </a:solidFill>
+              </a:rPr>
+              <a:t> </a:t>
+            </a:r>
+            <a:r>
+              <a:rPr lang="en-US" dirty="0" err="1">
+                <a:solidFill>
+                  <a:schemeClr val="bg1"/>
+                </a:solidFill>
+              </a:rPr>
+              <a:t>essa</a:t>
+            </a:r>
+            <a:r>
+              <a:rPr lang="en-US" dirty="0">
+                <a:solidFill>
+                  <a:schemeClr val="bg1"/>
+                </a:solidFill>
+              </a:rPr>
+              <a:t> </a:t>
+            </a:r>
+            <a:r>
+              <a:rPr lang="en-US" dirty="0" err="1">
+                <a:solidFill>
+                  <a:schemeClr val="bg1"/>
+                </a:solidFill>
+              </a:rPr>
+              <a:t>linha</a:t>
+            </a:r>
+            <a:r>
+              <a:rPr lang="en-US" dirty="0">
+                <a:solidFill>
+                  <a:schemeClr val="bg1"/>
+                </a:solidFill>
+              </a:rPr>
+              <a:t> em </a:t>
+            </a:r>
+            <a:r>
+              <a:rPr lang="en-US" dirty="0" err="1">
+                <a:solidFill>
+                  <a:schemeClr val="bg1"/>
+                </a:solidFill>
+              </a:rPr>
+              <a:t>branco</a:t>
+            </a:r>
+            <a:r>
+              <a:rPr lang="en-US" dirty="0">
+                <a:solidFill>
+                  <a:schemeClr val="bg1"/>
+                </a:solidFill>
+              </a:rPr>
+              <a:t>?</a:t>
             </a:r>
           </a:p>
           <a:p>
+            <a:r>
+              <a:rPr lang="en-US" dirty="0" err="1">
+                <a:solidFill>
+                  <a:schemeClr val="bg1"/>
+                </a:solidFill>
+              </a:rPr>
+              <a:t>Linha</a:t>
+            </a:r>
+            <a:r>
+              <a:rPr lang="en-US" dirty="0">
+                <a:solidFill>
+                  <a:schemeClr val="bg1"/>
+                </a:solidFill>
+              </a:rPr>
+              <a:t> em </a:t>
+            </a:r>
+            <a:r>
+              <a:rPr lang="en-US" dirty="0" err="1">
+                <a:solidFill>
+                  <a:schemeClr val="bg1"/>
+                </a:solidFill>
+              </a:rPr>
+              <a:t>branco</a:t>
+            </a:r>
             <a:endParaRPr lang="en-US" dirty="0">
               <a:solidFill>
                 <a:schemeClr val="bg1"/>
@@ -42128,27 +42729,23 @@
                   <a:schemeClr val="bg1"/>
                 </a:solidFill>
               </a:rPr>
-              <a:t>Did you see that blank line?</a:t>
+              <a:t>no </a:t>
             </a:r>
-          </a:p>
-          <a:p>
+            <a:r>
+              <a:rPr lang="en-US" dirty="0" err="1">
+                <a:solidFill>
+                  <a:schemeClr val="bg1"/>
+                </a:solidFill>
+              </a:rPr>
+              <a:t>meio</a:t>
+            </a:r>
             <a:r>
               <a:rPr lang="en-US" dirty="0">
                 <a:solidFill>
                   <a:schemeClr val="bg1"/>
                 </a:solidFill>
               </a:rPr>
-              <a:t>Blank line</a:t>
-            </a:r>
-          </a:p>
-          <a:p>
-            <a:r>
-              <a:rPr lang="en-US" dirty="0">
-                <a:solidFill>
-                  <a:schemeClr val="bg1"/>
-                </a:solidFill>
-              </a:rPr>
-              <a:t>in the middle of string</a:t>
+              <a:t> da string</a:t>
             </a:r>
           </a:p>
         </p:txBody>
@@ -42285,8 +42882,12 @@
           <a:lstStyle/>
           <a:p>
             <a:r>
+              <a:rPr lang="en-US" b="1" dirty="0" err="1"/>
+              <a:t>Depurando</a:t>
+            </a:r>
+            <a:r>
               <a:rPr lang="en-US" b="1" dirty="0"/>
-              <a:t>Debugging with print</a:t>
+              <a:t> com print</a:t>
             </a:r>
             <a:endParaRPr lang="en-US" dirty="0"/>
           </a:p>
@@ -42322,7 +42923,39 @@
                   <a:srgbClr val="C00000"/>
                 </a:solidFill>
               </a:rPr>
-              <a:t>'Adding numbers'</a:t>
+              <a:t>‘</a:t>
+            </a:r>
+            <a:r>
+              <a:rPr lang="en-US" sz="2800" dirty="0" err="1">
+                <a:solidFill>
+                  <a:srgbClr val="C00000"/>
+                </a:solidFill>
+              </a:rPr>
+              <a:t>Adicionando</a:t>
+            </a:r>
+            <a:r>
+              <a:rPr lang="en-US" sz="2800" dirty="0">
+                <a:solidFill>
+                  <a:srgbClr val="C00000"/>
+                </a:solidFill>
+              </a:rPr>
+              <a:t> </a:t>
+            </a:r>
+            <a:r>
+              <a:rPr lang="en-US" sz="2800" dirty="0" err="1">
+                <a:solidFill>
+                  <a:srgbClr val="C00000"/>
+                </a:solidFill>
+              </a:rPr>
+              <a:t>números</a:t>
+            </a:r>
+            <a:r>
+              <a:rPr lang="en-US" sz="2800" dirty="0">
+                <a:solidFill>
+                  <a:srgbClr val="C00000"/>
+                </a:solidFill>
+              </a:rPr>
+              <a:t>'</a:t>
             </a:r>
             <a:r>
               <a:rPr lang="en-US" sz="2800" dirty="0">
@@ -42350,7 +42983,39 @@
                   <a:srgbClr val="C00000"/>
                 </a:solidFill>
               </a:rPr>
-              <a:t>'Performing division'</a:t>
+              <a:t>‘</a:t>
+            </a:r>
+            <a:r>
+              <a:rPr lang="en-US" sz="2800" dirty="0" err="1">
+                <a:solidFill>
+                  <a:srgbClr val="C00000"/>
+                </a:solidFill>
+              </a:rPr>
+              <a:t>Realizando</a:t>
+            </a:r>
+            <a:r>
+              <a:rPr lang="en-US" sz="2800" dirty="0">
+                <a:solidFill>
+                  <a:srgbClr val="C00000"/>
+                </a:solidFill>
+              </a:rPr>
+              <a:t> a </a:t>
+            </a:r>
+            <a:r>
+              <a:rPr lang="en-US" sz="2800" dirty="0" err="1">
+                <a:solidFill>
+                  <a:srgbClr val="C00000"/>
+                </a:solidFill>
+              </a:rPr>
+              <a:t>divisão</a:t>
+            </a:r>
+            <a:r>
+              <a:rPr lang="en-US" sz="2800" dirty="0">
+                <a:solidFill>
+                  <a:srgbClr val="C00000"/>
+                </a:solidFill>
+              </a:rPr>
+              <a:t>'</a:t>
             </a:r>
             <a:r>
               <a:rPr lang="en-US" sz="2800" dirty="0">
@@ -42378,7 +43043,39 @@
                   <a:srgbClr val="C00000"/>
                 </a:solidFill>
               </a:rPr>
-              <a:t>'Math complete'</a:t>
+              <a:t>‘</a:t>
+            </a:r>
+            <a:r>
+              <a:rPr lang="en-US" sz="2800" dirty="0" err="1">
+                <a:solidFill>
+                  <a:srgbClr val="C00000"/>
+                </a:solidFill>
+              </a:rPr>
+              <a:t>Cálculo</a:t>
+            </a:r>
+            <a:r>
+              <a:rPr lang="en-US" sz="2800" dirty="0">
+                <a:solidFill>
+                  <a:srgbClr val="C00000"/>
+                </a:solidFill>
+              </a:rPr>
+              <a:t> </a:t>
+            </a:r>
+            <a:r>
+              <a:rPr lang="en-US" sz="2800" dirty="0" err="1">
+                <a:solidFill>
+                  <a:srgbClr val="C00000"/>
+                </a:solidFill>
+              </a:rPr>
+              <a:t>concluído</a:t>
+            </a:r>
+            <a:r>
+              <a:rPr lang="en-US" sz="2800" dirty="0">
+                <a:solidFill>
+                  <a:srgbClr val="C00000"/>
+                </a:solidFill>
+              </a:rPr>
+              <a:t>'</a:t>
             </a:r>
             <a:r>
               <a:rPr lang="en-US" sz="2800" dirty="0">
@@ -42655,23 +43352,65 @@
           </a:lstStyle>
           <a:p>
             <a:r>
-              <a:rPr lang="en-US" sz="2800" dirty="0">
+              <a:rPr lang="en-US" sz="2800" dirty="0" err="1">
                 <a:solidFill>
                   <a:schemeClr val="bg1"/>
                 </a:solidFill>
               </a:rPr>
-              <a:t>Adding numbers</a:t>
+              <a:t>Adicionando</a:t>
             </a:r>
-          </a:p>
-          <a:p>
             <a:r>
               <a:rPr lang="en-US" sz="2800" dirty="0">
                 <a:solidFill>
                   <a:schemeClr val="bg1"/>
                 </a:solidFill>
               </a:rPr>
-              <a:t>Performing division</a:t>
+              <a:t> </a:t>
             </a:r>
+            <a:r>
+              <a:rPr lang="en-US" sz="2800" dirty="0" err="1">
+                <a:solidFill>
+                  <a:schemeClr val="bg1"/>
+                </a:solidFill>
+              </a:rPr>
+              <a:t>números</a:t>
+            </a:r>
+            <a:endParaRPr lang="en-US" sz="2800" dirty="0">
+              <a:solidFill>
+                <a:schemeClr val="bg1"/>
+              </a:solidFill>
+            </a:endParaRPr>
+          </a:p>
+          <a:p>
+            <a:r>
+              <a:rPr lang="en-US" sz="2800" dirty="0" err="1">
+                <a:solidFill>
+                  <a:schemeClr val="bg1"/>
+                </a:solidFill>
+              </a:rPr>
+              <a:t>Realizando</a:t>
+            </a:r>
+            <a:r>
+              <a:rPr lang="en-US" sz="2800" dirty="0">
+                <a:solidFill>
+                  <a:schemeClr val="bg1"/>
+                </a:solidFill>
+              </a:rPr>
+              <a:t> a </a:t>
+            </a:r>
+            <a:r>
+              <a:rPr lang="en-US" sz="2800" dirty="0" err="1">
+                <a:solidFill>
+                  <a:schemeClr val="bg1"/>
+                </a:solidFill>
+              </a:rPr>
+              <a:t>divisão</a:t>
+            </a:r>
+            <a:endParaRPr lang="en-US" sz="2800" dirty="0">
+              <a:solidFill>
+                <a:schemeClr val="bg1"/>
+              </a:solidFill>
+            </a:endParaRPr>
           </a:p>
           <a:p>
             <a:r>
@@ -43963,14 +44702,17 @@
 </file>
 
 <file path=customXml/item1.xml><?xml version="1.0" encoding="utf-8"?>
-<Control xmlns="http://schemas.microsoft.com/VisualStudio/2011/storyboarding/control">
-  <Id Name="fb22c541-ded0-47fa-8877-83a4c2d16227" Revision="1" Stencil="7276b9ef-3953-4dce-a89b-ed85f20b8b93" StencilVersion="1.0"/>
-</Control>
+<?mso-contentType ?>
+<FormTemplates xmlns="http://schemas.microsoft.com/sharepoint/v3/contenttype/forms">
+  <Display>DocumentLibraryForm</Display>
+  <Edit>DocumentLibraryForm</Edit>
+  <New>DocumentLibraryForm</New>
+</FormTemplates>
 </file>
 
 <file path=customXml/item10.xml><?xml version="1.0" encoding="utf-8"?>
 <Control xmlns="http://schemas.microsoft.com/VisualStudio/2011/storyboarding/control">
-  <Id Name="d69996e1-3d61-4686-9b63-f1b855c596ab" Revision="1" Stencil="7276b9ef-3953-4dce-a89b-ed85f20b8b93" StencilVersion="1.0"/>
+  <Id Name="369f9055-6b6c-48b9-9320-5df2d46c430a" Revision="1" Stencil="7276b9ef-3953-4dce-a89b-ed85f20b8b93" StencilVersion="1.0"/>
 </Control>
 </file>
 
@@ -43981,27 +44723,18 @@
 </file>
 
 <file path=customXml/item12.xml><?xml version="1.0" encoding="utf-8"?>
-<?mso-contentType ?>
-<FormTemplates xmlns="http://schemas.microsoft.com/sharepoint/v3/contenttype/forms">
-  <Display>DocumentLibraryForm</Display>
-  <Edit>DocumentLibraryForm</Edit>
-  <New>DocumentLibraryForm</New>
-</FormTemplates>
+<Control xmlns="http://schemas.microsoft.com/VisualStudio/2011/storyboarding/control">
+  <Id Name="369f9055-6b6c-48b9-9320-5df2d46c430a" Revision="1" Stencil="7276b9ef-3953-4dce-a89b-ed85f20b8b93" StencilVersion="1.0"/>
+</Control>
 </file>
 
 <file path=customXml/item13.xml><?xml version="1.0" encoding="utf-8"?>
 <Control xmlns="http://schemas.microsoft.com/VisualStudio/2011/storyboarding/control">
-  <Id Name="d69996e1-3d61-4686-9b63-f1b855c596ab" Revision="1" Stencil="7276b9ef-3953-4dce-a89b-ed85f20b8b93" StencilVersion="1.0"/>
+  <Id Name="369f9055-6b6c-48b9-9320-5df2d46c430a" Revision="1" Stencil="7276b9ef-3953-4dce-a89b-ed85f20b8b93" StencilVersion="1.0"/>
 </Control>
 </file>
 
 <file path=customXml/item14.xml><?xml version="1.0" encoding="utf-8"?>
-<Control xmlns="http://schemas.microsoft.com/VisualStudio/2011/storyboarding/control">
-  <Id Name="a53d73d2-368b-429e-b817-1324eec1382c" Revision="1" Stencil="7276b9ef-3953-4dce-a89b-ed85f20b8b93" StencilVersion="1.0"/>
-</Control>
-</file>
-
-<file path=customXml/item15.xml><?xml version="1.0" encoding="utf-8"?>
 <p:properties xmlns:p="http://schemas.microsoft.com/office/2006/metadata/properties" xmlns:xsi="http://www.w3.org/2001/XMLSchema-instance" xmlns:pc="http://schemas.microsoft.com/office/infopath/2007/PartnerControls">
   <documentManagement>
     <SharedWithUsers xmlns="83cd2334-221a-48c3-9034-bfd1542dfe28">
@@ -44025,31 +44758,388 @@
 </p:properties>
 </file>
 
+<file path=customXml/item15.xml><?xml version="1.0" encoding="utf-8"?>
+<Control xmlns="http://schemas.microsoft.com/VisualStudio/2011/storyboarding/control">
+  <Id Name="a53d73d2-368b-429e-b817-1324eec1382c" Revision="1" Stencil="7276b9ef-3953-4dce-a89b-ed85f20b8b93" StencilVersion="1.0"/>
+</Control>
+</file>
+
 <file path=customXml/item16.xml><?xml version="1.0" encoding="utf-8"?>
+<Control xmlns="http://schemas.microsoft.com/VisualStudio/2011/storyboarding/control">
+  <Id Name="a53d73d2-368b-429e-b817-1324eec1382c" Revision="1" Stencil="7276b9ef-3953-4dce-a89b-ed85f20b8b93" StencilVersion="1.0"/>
+</Control>
+</file>
+
+<file path=customXml/item17.xml><?xml version="1.0" encoding="utf-8"?>
+<?mso-contentType ?>
+<FormTemplates xmlns="http://schemas.microsoft.com/sharepoint/v3/contenttype/forms">
+  <Display>DocumentLibraryForm</Display>
+  <Edit>DocumentLibraryForm</Edit>
+  <New>DocumentLibraryForm</New>
+</FormTemplates>
+</file>
+
+<file path=customXml/item18.xml><?xml version="1.0" encoding="utf-8"?>
+<Control xmlns="http://schemas.microsoft.com/VisualStudio/2011/storyboarding/control">
+  <Id Name="369f9055-6b6c-48b9-9320-5df2d46c430a" Revision="1" Stencil="7276b9ef-3953-4dce-a89b-ed85f20b8b93" StencilVersion="1.0"/>
+</Control>
+</file>
+
+<file path=customXml/item19.xml><?xml version="1.0" encoding="utf-8"?>
+<Control xmlns="http://schemas.microsoft.com/VisualStudio/2011/storyboarding/control">
+  <Id Name="a53d73d2-368b-429e-b817-1324eec1382c" Revision="1" Stencil="7276b9ef-3953-4dce-a89b-ed85f20b8b93" StencilVersion="1.0"/>
+</Control>
+</file>
+
+<file path=customXml/item2.xml><?xml version="1.0" encoding="utf-8"?>
+<p:properties xmlns:p="http://schemas.microsoft.com/office/2006/metadata/properties" xmlns:xsi="http://www.w3.org/2001/XMLSchema-instance" xmlns:pc="http://schemas.microsoft.com/office/infopath/2007/PartnerControls">
+  <documentManagement>
+    <SharedWithUsers xmlns="83cd2334-221a-48c3-9034-bfd1542dfe28">
+      <UserInfo>
+        <DisplayName>Gilad Turbahn</DisplayName>
+        <AccountId>511</AccountId>
+        <AccountType/>
+      </UserInfo>
+      <UserInfo>
+        <DisplayName>Keith Boyd</DisplayName>
+        <AccountId>993</AccountId>
+        <AccountType/>
+      </UserInfo>
+      <UserInfo>
+        <DisplayName>Christopher Harrison</DisplayName>
+        <AccountId>1176</AccountId>
+        <AccountType/>
+      </UserInfo>
+    </SharedWithUsers>
+  </documentManagement>
+</p:properties>
+</file>
+
+<file path=customXml/item20.xml><?xml version="1.0" encoding="utf-8"?>
 <Control xmlns="http://schemas.microsoft.com/VisualStudio/2011/storyboarding/control">
   <Id Name="d69996e1-3d61-4686-9b63-f1b855c596ab" Revision="1" Stencil="7276b9ef-3953-4dce-a89b-ed85f20b8b93" StencilVersion="1.0"/>
 </Control>
 </file>
 
-<file path=customXml/item17.xml><?xml version="1.0" encoding="utf-8"?>
+<file path=customXml/item21.xml><?xml version="1.0" encoding="utf-8"?>
+<Control xmlns="http://schemas.microsoft.com/VisualStudio/2011/storyboarding/control">
+  <Id Name="fb22c541-ded0-47fa-8877-83a4c2d16227" Revision="1" Stencil="7276b9ef-3953-4dce-a89b-ed85f20b8b93" StencilVersion="1.0"/>
+</Control>
+</file>
+
+<file path=customXml/item22.xml><?xml version="1.0" encoding="utf-8"?>
+<?mso-contentType ?>
+<FormTemplates xmlns="http://schemas.microsoft.com/sharepoint/v3/contenttype/forms">
+  <Display>DocumentLibraryForm</Display>
+  <Edit>DocumentLibraryForm</Edit>
+  <New>DocumentLibraryForm</New>
+</FormTemplates>
+</file>
+
+<file path=customXml/item23.xml><?xml version="1.0" encoding="utf-8"?>
+<Control xmlns="http://schemas.microsoft.com/VisualStudio/2011/storyboarding/control">
+  <Id Name="fb22c541-ded0-47fa-8877-83a4c2d16227" Revision="1" Stencil="7276b9ef-3953-4dce-a89b-ed85f20b8b93" StencilVersion="1.0"/>
+</Control>
+</file>
+
+<file path=customXml/item24.xml><?xml version="1.0" encoding="utf-8"?>
+<?mso-contentType ?>
+<FormTemplates xmlns="http://schemas.microsoft.com/sharepoint/v3/contenttype/forms">
+  <Display>DocumentLibraryForm</Display>
+  <Edit>DocumentLibraryForm</Edit>
+  <New>DocumentLibraryForm</New>
+</FormTemplates>
+</file>
+
+<file path=customXml/item25.xml><?xml version="1.0" encoding="utf-8"?>
+<Control xmlns="http://schemas.microsoft.com/VisualStudio/2011/storyboarding/control">
+  <Id Name="369f9055-6b6c-48b9-9320-5df2d46c430a" Revision="1" Stencil="7276b9ef-3953-4dce-a89b-ed85f20b8b93" StencilVersion="1.0"/>
+</Control>
+</file>
+
+<file path=customXml/item26.xml><?xml version="1.0" encoding="utf-8"?>
+<Control xmlns="http://schemas.microsoft.com/VisualStudio/2011/storyboarding/control">
+  <Id Name="fb22c541-ded0-47fa-8877-83a4c2d16227" Revision="1" Stencil="7276b9ef-3953-4dce-a89b-ed85f20b8b93" StencilVersion="1.0"/>
+</Control>
+</file>
+
+<file path=customXml/item27.xml><?xml version="1.0" encoding="utf-8"?>
+<?mso-contentType ?>
+<FormTemplates xmlns="http://schemas.microsoft.com/sharepoint/v3/contenttype/forms">
+  <Display>DocumentLibraryForm</Display>
+  <Edit>DocumentLibraryForm</Edit>
+  <New>DocumentLibraryForm</New>
+</FormTemplates>
+</file>
+
+<file path=customXml/item28.xml><?xml version="1.0" encoding="utf-8"?>
 <Control xmlns="http://schemas.microsoft.com/VisualStudio/2011/storyboarding/control">
   <Id Name="d69996e1-3d61-4686-9b63-f1b855c596ab" Revision="1" Stencil="7276b9ef-3953-4dce-a89b-ed85f20b8b93" StencilVersion="1.0"/>
 </Control>
 </file>
 
-<file path=customXml/item18.xml><?xml version="1.0" encoding="utf-8"?>
+<file path=customXml/item29.xml><?xml version="1.0" encoding="utf-8"?>
 <Control xmlns="http://schemas.microsoft.com/VisualStudio/2011/storyboarding/control">
   <Id Name="a2191c86-fc50-4add-948c-129f6b5a88d8" Revision="1" Stencil="7276b9ef-3953-4dce-a89b-ed85f20b8b93" StencilVersion="1.0"/>
 </Control>
 </file>
 
-<file path=customXml/item19.xml><?xml version="1.0" encoding="utf-8"?>
+<file path=customXml/item3.xml><?xml version="1.0" encoding="utf-8"?>
+<Control xmlns="http://schemas.microsoft.com/VisualStudio/2011/storyboarding/control">
+  <Id Name="fb22c541-ded0-47fa-8877-83a4c2d16227" Revision="1" Stencil="7276b9ef-3953-4dce-a89b-ed85f20b8b93" StencilVersion="1.0"/>
+</Control>
+</file>
+
+<file path=customXml/item30.xml><?xml version="1.0" encoding="utf-8"?>
+<p:properties xmlns:p="http://schemas.microsoft.com/office/2006/metadata/properties" xmlns:xsi="http://www.w3.org/2001/XMLSchema-instance" xmlns:pc="http://schemas.microsoft.com/office/infopath/2007/PartnerControls">
+  <documentManagement>
+    <SharedWithUsers xmlns="83cd2334-221a-48c3-9034-bfd1542dfe28">
+      <UserInfo>
+        <DisplayName>Gilad Turbahn</DisplayName>
+        <AccountId>511</AccountId>
+        <AccountType/>
+      </UserInfo>
+      <UserInfo>
+        <DisplayName>Keith Boyd</DisplayName>
+        <AccountId>993</AccountId>
+        <AccountType/>
+      </UserInfo>
+      <UserInfo>
+        <DisplayName>Christopher Harrison</DisplayName>
+        <AccountId>1176</AccountId>
+        <AccountType/>
+      </UserInfo>
+    </SharedWithUsers>
+  </documentManagement>
+</p:properties>
+</file>
+
+<file path=customXml/item31.xml><?xml version="1.0" encoding="utf-8"?>
+<?mso-contentType ?>
+<FormTemplates xmlns="http://schemas.microsoft.com/sharepoint/v3/contenttype/forms">
+  <Display>DocumentLibraryForm</Display>
+  <Edit>DocumentLibraryForm</Edit>
+  <New>DocumentLibraryForm</New>
+</FormTemplates>
+</file>
+
+<file path=customXml/item32.xml><?xml version="1.0" encoding="utf-8"?>
 <Control xmlns="http://schemas.microsoft.com/VisualStudio/2011/storyboarding/control">
   <Id Name="369f9055-6b6c-48b9-9320-5df2d46c430a" Revision="1" Stencil="7276b9ef-3953-4dce-a89b-ed85f20b8b93" StencilVersion="1.0"/>
 </Control>
 </file>
 
-<file path=customXml/item2.xml><?xml version="1.0" encoding="utf-8"?>
+<file path=customXml/item33.xml><?xml version="1.0" encoding="utf-8"?>
+<Control xmlns="http://schemas.microsoft.com/VisualStudio/2011/storyboarding/control">
+  <Id Name="d69996e1-3d61-4686-9b63-f1b855c596ab" Revision="1" Stencil="7276b9ef-3953-4dce-a89b-ed85f20b8b93" StencilVersion="1.0"/>
+</Control>
+</file>
+
+<file path=customXml/item34.xml><?xml version="1.0" encoding="utf-8"?>
+<Control xmlns="http://schemas.microsoft.com/VisualStudio/2011/storyboarding/control">
+  <Id Name="a2191c86-fc50-4add-948c-129f6b5a88d8" Revision="1" Stencil="7276b9ef-3953-4dce-a89b-ed85f20b8b93" StencilVersion="1.0"/>
+</Control>
+</file>
+
+<file path=customXml/item35.xml><?xml version="1.0" encoding="utf-8"?>
+<Control xmlns="http://schemas.microsoft.com/VisualStudio/2011/storyboarding/control">
+  <Id Name="fb22c541-ded0-47fa-8877-83a4c2d16227" Revision="1" Stencil="7276b9ef-3953-4dce-a89b-ed85f20b8b93" StencilVersion="1.0"/>
+</Control>
+</file>
+
+<file path=customXml/item36.xml><?xml version="1.0" encoding="utf-8"?>
+<?mso-contentType ?>
+<FormTemplates xmlns="http://schemas.microsoft.com/sharepoint/v3/contenttype/forms">
+  <Display>DocumentLibraryForm</Display>
+  <Edit>DocumentLibraryForm</Edit>
+  <New>DocumentLibraryForm</New>
+</FormTemplates>
+</file>
+
+<file path=customXml/item37.xml><?xml version="1.0" encoding="utf-8"?>
+<p:properties xmlns:p="http://schemas.microsoft.com/office/2006/metadata/properties" xmlns:xsi="http://www.w3.org/2001/XMLSchema-instance" xmlns:pc="http://schemas.microsoft.com/office/infopath/2007/PartnerControls">
+  <documentManagement>
+    <SharedWithUsers xmlns="83cd2334-221a-48c3-9034-bfd1542dfe28">
+      <UserInfo>
+        <DisplayName>Gilad Turbahn</DisplayName>
+        <AccountId>511</AccountId>
+        <AccountType/>
+      </UserInfo>
+      <UserInfo>
+        <DisplayName>Keith Boyd</DisplayName>
+        <AccountId>993</AccountId>
+        <AccountType/>
+      </UserInfo>
+      <UserInfo>
+        <DisplayName>Christopher Harrison</DisplayName>
+        <AccountId>1176</AccountId>
+        <AccountType/>
+      </UserInfo>
+    </SharedWithUsers>
+  </documentManagement>
+</p:properties>
+</file>
+
+<file path=customXml/item38.xml><?xml version="1.0" encoding="utf-8"?>
+<Control xmlns="http://schemas.microsoft.com/VisualStudio/2011/storyboarding/control">
+  <Id Name="a53d73d2-368b-429e-b817-1324eec1382c" Revision="1" Stencil="7276b9ef-3953-4dce-a89b-ed85f20b8b93" StencilVersion="1.0"/>
+</Control>
+</file>
+
+<file path=customXml/item39.xml><?xml version="1.0" encoding="utf-8"?>
+<?mso-contentType ?>
+<FormTemplates xmlns="http://schemas.microsoft.com/sharepoint/v3/contenttype/forms">
+  <Display>DocumentLibraryForm</Display>
+  <Edit>DocumentLibraryForm</Edit>
+  <New>DocumentLibraryForm</New>
+</FormTemplates>
+</file>
+
+<file path=customXml/item4.xml><?xml version="1.0" encoding="utf-8"?>
+<p:properties xmlns:p="http://schemas.microsoft.com/office/2006/metadata/properties" xmlns:xsi="http://www.w3.org/2001/XMLSchema-instance" xmlns:pc="http://schemas.microsoft.com/office/infopath/2007/PartnerControls">
+  <documentManagement>
+    <SharedWithUsers xmlns="83cd2334-221a-48c3-9034-bfd1542dfe28">
+      <UserInfo>
+        <DisplayName>Gilad Turbahn</DisplayName>
+        <AccountId>511</AccountId>
+        <AccountType/>
+      </UserInfo>
+      <UserInfo>
+        <DisplayName>Keith Boyd</DisplayName>
+        <AccountId>993</AccountId>
+        <AccountType/>
+      </UserInfo>
+      <UserInfo>
+        <DisplayName>Christopher Harrison</DisplayName>
+        <AccountId>1176</AccountId>
+        <AccountType/>
+      </UserInfo>
+    </SharedWithUsers>
+  </documentManagement>
+</p:properties>
+</file>
+
+<file path=customXml/item40.xml><?xml version="1.0" encoding="utf-8"?>
+<Control xmlns="http://schemas.microsoft.com/VisualStudio/2011/storyboarding/control">
+  <Id Name="a53d73d2-368b-429e-b817-1324eec1382c" Revision="1" Stencil="7276b9ef-3953-4dce-a89b-ed85f20b8b93" StencilVersion="1.0"/>
+</Control>
+</file>
+
+<file path=customXml/item41.xml><?xml version="1.0" encoding="utf-8"?>
+<Control xmlns="http://schemas.microsoft.com/VisualStudio/2011/storyboarding/control">
+  <Id Name="d69996e1-3d61-4686-9b63-f1b855c596ab" Revision="1" Stencil="7276b9ef-3953-4dce-a89b-ed85f20b8b93" StencilVersion="1.0"/>
+</Control>
+</file>
+
+<file path=customXml/item42.xml><?xml version="1.0" encoding="utf-8"?>
+<Control xmlns="http://schemas.microsoft.com/VisualStudio/2011/storyboarding/control">
+  <Id Name="fb22c541-ded0-47fa-8877-83a4c2d16227" Revision="1" Stencil="7276b9ef-3953-4dce-a89b-ed85f20b8b93" StencilVersion="1.0"/>
+</Control>
+</file>
+
+<file path=customXml/item43.xml><?xml version="1.0" encoding="utf-8"?>
+<p:properties xmlns:p="http://schemas.microsoft.com/office/2006/metadata/properties" xmlns:xsi="http://www.w3.org/2001/XMLSchema-instance" xmlns:pc="http://schemas.microsoft.com/office/infopath/2007/PartnerControls">
+  <documentManagement>
+    <SharedWithUsers xmlns="83cd2334-221a-48c3-9034-bfd1542dfe28">
+      <UserInfo>
+        <DisplayName>Gilad Turbahn</DisplayName>
+        <AccountId>511</AccountId>
+        <AccountType/>
+      </UserInfo>
+      <UserInfo>
+        <DisplayName>Keith Boyd</DisplayName>
+        <AccountId>993</AccountId>
+        <AccountType/>
+      </UserInfo>
+      <UserInfo>
+        <DisplayName>Christopher Harrison</DisplayName>
+        <AccountId>1176</AccountId>
+        <AccountType/>
+      </UserInfo>
+    </SharedWithUsers>
+  </documentManagement>
+</p:properties>
+</file>
+
+<file path=customXml/item44.xml><?xml version="1.0" encoding="utf-8"?>
+<p:properties xmlns:p="http://schemas.microsoft.com/office/2006/metadata/properties" xmlns:xsi="http://www.w3.org/2001/XMLSchema-instance" xmlns:pc="http://schemas.microsoft.com/office/infopath/2007/PartnerControls">
+  <documentManagement>
+    <SharedWithUsers xmlns="83cd2334-221a-48c3-9034-bfd1542dfe28">
+      <UserInfo>
+        <DisplayName>Gilad Turbahn</DisplayName>
+        <AccountId>511</AccountId>
+        <AccountType/>
+      </UserInfo>
+      <UserInfo>
+        <DisplayName>Keith Boyd</DisplayName>
+        <AccountId>993</AccountId>
+        <AccountType/>
+      </UserInfo>
+      <UserInfo>
+        <DisplayName>Christopher Harrison</DisplayName>
+        <AccountId>1176</AccountId>
+        <AccountType/>
+      </UserInfo>
+    </SharedWithUsers>
+  </documentManagement>
+</p:properties>
+</file>
+
+<file path=customXml/item45.xml><?xml version="1.0" encoding="utf-8"?>
+<Control xmlns="http://schemas.microsoft.com/VisualStudio/2011/storyboarding/control">
+  <Id Name="a53d73d2-368b-429e-b817-1324eec1382c" Revision="1" Stencil="7276b9ef-3953-4dce-a89b-ed85f20b8b93" StencilVersion="1.0"/>
+</Control>
+</file>
+
+<file path=customXml/item46.xml><?xml version="1.0" encoding="utf-8"?>
+<Control xmlns="http://schemas.microsoft.com/VisualStudio/2011/storyboarding/control">
+  <Id Name="d69996e1-3d61-4686-9b63-f1b855c596ab" Revision="1" Stencil="7276b9ef-3953-4dce-a89b-ed85f20b8b93" StencilVersion="1.0"/>
+</Control>
+</file>
+
+<file path=customXml/item47.xml><?xml version="1.0" encoding="utf-8"?>
+<Control xmlns="http://schemas.microsoft.com/VisualStudio/2011/storyboarding/control">
+  <Id Name="a2191c86-fc50-4add-948c-129f6b5a88d8" Revision="1" Stencil="7276b9ef-3953-4dce-a89b-ed85f20b8b93" StencilVersion="1.0"/>
+</Control>
+</file>
+
+<file path=customXml/item5.xml><?xml version="1.0" encoding="utf-8"?>
+<Control xmlns="http://schemas.microsoft.com/VisualStudio/2011/storyboarding/control">
+  <Id Name="a2191c86-fc50-4add-948c-129f6b5a88d8" Revision="1" Stencil="7276b9ef-3953-4dce-a89b-ed85f20b8b93" StencilVersion="1.0"/>
+</Control>
+</file>
+
+<file path=customXml/item6.xml><?xml version="1.0" encoding="utf-8"?>
+<Control xmlns="http://schemas.microsoft.com/VisualStudio/2011/storyboarding/control">
+  <Id Name="a2191c86-fc50-4add-948c-129f6b5a88d8" Revision="1" Stencil="7276b9ef-3953-4dce-a89b-ed85f20b8b93" StencilVersion="1.0"/>
+</Control>
+</file>
+
+<file path=customXml/item7.xml><?xml version="1.0" encoding="utf-8"?>
+<p:properties xmlns:p="http://schemas.microsoft.com/office/2006/metadata/properties" xmlns:xsi="http://www.w3.org/2001/XMLSchema-instance" xmlns:pc="http://schemas.microsoft.com/office/infopath/2007/PartnerControls">
+  <documentManagement>
+    <SharedWithUsers xmlns="83cd2334-221a-48c3-9034-bfd1542dfe28">
+      <UserInfo>
+        <DisplayName>Gilad Turbahn</DisplayName>
+        <AccountId>511</AccountId>
+        <AccountType/>
+      </UserInfo>
+      <UserInfo>
+        <DisplayName>Keith Boyd</DisplayName>
+        <AccountId>993</AccountId>
+        <AccountType/>
+      </UserInfo>
+      <UserInfo>
+        <DisplayName>Christopher Harrison</DisplayName>
+        <AccountId>1176</AccountId>
+        <AccountType/>
+      </UserInfo>
+    </SharedWithUsers>
+  </documentManagement>
+</p:properties>
+</file>
+
+<file path=customXml/item8.xml><?xml version="1.0" encoding="utf-8"?>
 <ct:contentTypeSchema xmlns:ct="http://schemas.microsoft.com/office/2006/metadata/contentType" xmlns:ma="http://schemas.microsoft.com/office/2006/metadata/properties/metaAttributes" ct:_="" ma:_="" ma:contentTypeName="Document" ma:contentTypeID="0x010100674EDBEC711BD14FBA6FF5C10FEFEAC7" ma:contentTypeVersion="2" ma:contentTypeDescription="Create a new document." ma:contentTypeScope="" ma:versionID="2439c5e21841780d4f192983b535a097">
   <xsd:schema xmlns:xsd="http://www.w3.org/2001/XMLSchema" xmlns:xs="http://www.w3.org/2001/XMLSchema" xmlns:p="http://schemas.microsoft.com/office/2006/metadata/properties" xmlns:ns2="83cd2334-221a-48c3-9034-bfd1542dfe28" targetNamespace="http://schemas.microsoft.com/office/2006/metadata/properties" ma:root="true" ma:fieldsID="2bca9163d8d0b233c3086236a9289b04" ns2:_="">
     <xsd:import namespace="83cd2334-221a-48c3-9034-bfd1542dfe28"/>
@@ -44197,373 +45287,22 @@
 </ct:contentTypeSchema>
 </file>
 
-<file path=customXml/item20.xml><?xml version="1.0" encoding="utf-8"?>
+<file path=customXml/item9.xml><?xml version="1.0" encoding="utf-8"?>
 <Control xmlns="http://schemas.microsoft.com/VisualStudio/2011/storyboarding/control">
   <Id Name="d69996e1-3d61-4686-9b63-f1b855c596ab" Revision="1" Stencil="7276b9ef-3953-4dce-a89b-ed85f20b8b93" StencilVersion="1.0"/>
 </Control>
 </file>
 
-<file path=customXml/item21.xml><?xml version="1.0" encoding="utf-8"?>
-<Control xmlns="http://schemas.microsoft.com/VisualStudio/2011/storyboarding/control">
-  <Id Name="fb22c541-ded0-47fa-8877-83a4c2d16227" Revision="1" Stencil="7276b9ef-3953-4dce-a89b-ed85f20b8b93" StencilVersion="1.0"/>
-</Control>
-</file>
-
-<file path=customXml/item22.xml><?xml version="1.0" encoding="utf-8"?>
-<Control xmlns="http://schemas.microsoft.com/VisualStudio/2011/storyboarding/control">
-  <Id Name="d69996e1-3d61-4686-9b63-f1b855c596ab" Revision="1" Stencil="7276b9ef-3953-4dce-a89b-ed85f20b8b93" StencilVersion="1.0"/>
-</Control>
-</file>
-
-<file path=customXml/item23.xml><?xml version="1.0" encoding="utf-8"?>
-<Control xmlns="http://schemas.microsoft.com/VisualStudio/2011/storyboarding/control">
-  <Id Name="a53d73d2-368b-429e-b817-1324eec1382c" Revision="1" Stencil="7276b9ef-3953-4dce-a89b-ed85f20b8b93" StencilVersion="1.0"/>
-</Control>
-</file>
-
-<file path=customXml/item24.xml><?xml version="1.0" encoding="utf-8"?>
-<Control xmlns="http://schemas.microsoft.com/VisualStudio/2011/storyboarding/control">
-  <Id Name="369f9055-6b6c-48b9-9320-5df2d46c430a" Revision="1" Stencil="7276b9ef-3953-4dce-a89b-ed85f20b8b93" StencilVersion="1.0"/>
-</Control>
-</file>
-
-<file path=customXml/item25.xml><?xml version="1.0" encoding="utf-8"?>
-<Control xmlns="http://schemas.microsoft.com/VisualStudio/2011/storyboarding/control">
-  <Id Name="a2191c86-fc50-4add-948c-129f6b5a88d8" Revision="1" Stencil="7276b9ef-3953-4dce-a89b-ed85f20b8b93" StencilVersion="1.0"/>
-</Control>
-</file>
-
-<file path=customXml/item26.xml><?xml version="1.0" encoding="utf-8"?>
-<?mso-contentType ?>
-<FormTemplates xmlns="http://schemas.microsoft.com/sharepoint/v3/contenttype/forms">
-  <Display>DocumentLibraryForm</Display>
-  <Edit>DocumentLibraryForm</Edit>
-  <New>DocumentLibraryForm</New>
-</FormTemplates>
-</file>
-
-<file path=customXml/item27.xml><?xml version="1.0" encoding="utf-8"?>
-<Control xmlns="http://schemas.microsoft.com/VisualStudio/2011/storyboarding/control">
-  <Id Name="fb22c541-ded0-47fa-8877-83a4c2d16227" Revision="1" Stencil="7276b9ef-3953-4dce-a89b-ed85f20b8b93" StencilVersion="1.0"/>
-</Control>
-</file>
-
-<file path=customXml/item28.xml><?xml version="1.0" encoding="utf-8"?>
-<?mso-contentType ?>
-<FormTemplates xmlns="http://schemas.microsoft.com/sharepoint/v3/contenttype/forms">
-  <Display>DocumentLibraryForm</Display>
-  <Edit>DocumentLibraryForm</Edit>
-  <New>DocumentLibraryForm</New>
-</FormTemplates>
-</file>
-
-<file path=customXml/item29.xml><?xml version="1.0" encoding="utf-8"?>
-<Control xmlns="http://schemas.microsoft.com/VisualStudio/2011/storyboarding/control">
-  <Id Name="369f9055-6b6c-48b9-9320-5df2d46c430a" Revision="1" Stencil="7276b9ef-3953-4dce-a89b-ed85f20b8b93" StencilVersion="1.0"/>
-</Control>
-</file>
-
-<file path=customXml/item3.xml><?xml version="1.0" encoding="utf-8"?>
-<Control xmlns="http://schemas.microsoft.com/VisualStudio/2011/storyboarding/control">
-  <Id Name="fb22c541-ded0-47fa-8877-83a4c2d16227" Revision="1" Stencil="7276b9ef-3953-4dce-a89b-ed85f20b8b93" StencilVersion="1.0"/>
-</Control>
-</file>
-
-<file path=customXml/item30.xml><?xml version="1.0" encoding="utf-8"?>
-<?mso-contentType ?>
-<FormTemplates xmlns="http://schemas.microsoft.com/sharepoint/v3/contenttype/forms">
-  <Display>DocumentLibraryForm</Display>
-  <Edit>DocumentLibraryForm</Edit>
-  <New>DocumentLibraryForm</New>
-</FormTemplates>
-</file>
-
-<file path=customXml/item31.xml><?xml version="1.0" encoding="utf-8"?>
-<Control xmlns="http://schemas.microsoft.com/VisualStudio/2011/storyboarding/control">
-  <Id Name="fb22c541-ded0-47fa-8877-83a4c2d16227" Revision="1" Stencil="7276b9ef-3953-4dce-a89b-ed85f20b8b93" StencilVersion="1.0"/>
-</Control>
-</file>
-
-<file path=customXml/item32.xml><?xml version="1.0" encoding="utf-8"?>
-<Control xmlns="http://schemas.microsoft.com/VisualStudio/2011/storyboarding/control">
-  <Id Name="369f9055-6b6c-48b9-9320-5df2d46c430a" Revision="1" Stencil="7276b9ef-3953-4dce-a89b-ed85f20b8b93" StencilVersion="1.0"/>
-</Control>
-</file>
-
-<file path=customXml/item33.xml><?xml version="1.0" encoding="utf-8"?>
-<p:properties xmlns:p="http://schemas.microsoft.com/office/2006/metadata/properties" xmlns:xsi="http://www.w3.org/2001/XMLSchema-instance" xmlns:pc="http://schemas.microsoft.com/office/infopath/2007/PartnerControls">
-  <documentManagement>
-    <SharedWithUsers xmlns="83cd2334-221a-48c3-9034-bfd1542dfe28">
-      <UserInfo>
-        <DisplayName>Gilad Turbahn</DisplayName>
-        <AccountId>511</AccountId>
-        <AccountType/>
-      </UserInfo>
-      <UserInfo>
-        <DisplayName>Keith Boyd</DisplayName>
-        <AccountId>993</AccountId>
-        <AccountType/>
-      </UserInfo>
-      <UserInfo>
-        <DisplayName>Christopher Harrison</DisplayName>
-        <AccountId>1176</AccountId>
-        <AccountType/>
-      </UserInfo>
-    </SharedWithUsers>
-  </documentManagement>
-</p:properties>
-</file>
-
-<file path=customXml/item34.xml><?xml version="1.0" encoding="utf-8"?>
-<p:properties xmlns:p="http://schemas.microsoft.com/office/2006/metadata/properties" xmlns:xsi="http://www.w3.org/2001/XMLSchema-instance" xmlns:pc="http://schemas.microsoft.com/office/infopath/2007/PartnerControls">
-  <documentManagement>
-    <SharedWithUsers xmlns="83cd2334-221a-48c3-9034-bfd1542dfe28">
-      <UserInfo>
-        <DisplayName>Gilad Turbahn</DisplayName>
-        <AccountId>511</AccountId>
-        <AccountType/>
-      </UserInfo>
-      <UserInfo>
-        <DisplayName>Keith Boyd</DisplayName>
-        <AccountId>993</AccountId>
-        <AccountType/>
-      </UserInfo>
-      <UserInfo>
-        <DisplayName>Christopher Harrison</DisplayName>
-        <AccountId>1176</AccountId>
-        <AccountType/>
-      </UserInfo>
-    </SharedWithUsers>
-  </documentManagement>
-</p:properties>
-</file>
-
-<file path=customXml/item35.xml><?xml version="1.0" encoding="utf-8"?>
-<Control xmlns="http://schemas.microsoft.com/VisualStudio/2011/storyboarding/control">
-  <Id Name="fb22c541-ded0-47fa-8877-83a4c2d16227" Revision="1" Stencil="7276b9ef-3953-4dce-a89b-ed85f20b8b93" StencilVersion="1.0"/>
-</Control>
-</file>
-
-<file path=customXml/item36.xml><?xml version="1.0" encoding="utf-8"?>
-<Control xmlns="http://schemas.microsoft.com/VisualStudio/2011/storyboarding/control">
-  <Id Name="a53d73d2-368b-429e-b817-1324eec1382c" Revision="1" Stencil="7276b9ef-3953-4dce-a89b-ed85f20b8b93" StencilVersion="1.0"/>
-</Control>
-</file>
-
-<file path=customXml/item37.xml><?xml version="1.0" encoding="utf-8"?>
-<p:properties xmlns:p="http://schemas.microsoft.com/office/2006/metadata/properties" xmlns:xsi="http://www.w3.org/2001/XMLSchema-instance" xmlns:pc="http://schemas.microsoft.com/office/infopath/2007/PartnerControls">
-  <documentManagement>
-    <SharedWithUsers xmlns="83cd2334-221a-48c3-9034-bfd1542dfe28">
-      <UserInfo>
-        <DisplayName>Gilad Turbahn</DisplayName>
-        <AccountId>511</AccountId>
-        <AccountType/>
-      </UserInfo>
-      <UserInfo>
-        <DisplayName>Keith Boyd</DisplayName>
-        <AccountId>993</AccountId>
-        <AccountType/>
-      </UserInfo>
-      <UserInfo>
-        <DisplayName>Christopher Harrison</DisplayName>
-        <AccountId>1176</AccountId>
-        <AccountType/>
-      </UserInfo>
-    </SharedWithUsers>
-  </documentManagement>
-</p:properties>
-</file>
-
-<file path=customXml/item38.xml><?xml version="1.0" encoding="utf-8"?>
-<?mso-contentType ?>
-<FormTemplates xmlns="http://schemas.microsoft.com/sharepoint/v3/contenttype/forms">
-  <Display>DocumentLibraryForm</Display>
-  <Edit>DocumentLibraryForm</Edit>
-  <New>DocumentLibraryForm</New>
-</FormTemplates>
-</file>
-
-<file path=customXml/item39.xml><?xml version="1.0" encoding="utf-8"?>
-<p:properties xmlns:p="http://schemas.microsoft.com/office/2006/metadata/properties" xmlns:xsi="http://www.w3.org/2001/XMLSchema-instance" xmlns:pc="http://schemas.microsoft.com/office/infopath/2007/PartnerControls">
-  <documentManagement>
-    <SharedWithUsers xmlns="83cd2334-221a-48c3-9034-bfd1542dfe28">
-      <UserInfo>
-        <DisplayName>Gilad Turbahn</DisplayName>
-        <AccountId>511</AccountId>
-        <AccountType/>
-      </UserInfo>
-      <UserInfo>
-        <DisplayName>Keith Boyd</DisplayName>
-        <AccountId>993</AccountId>
-        <AccountType/>
-      </UserInfo>
-      <UserInfo>
-        <DisplayName>Christopher Harrison</DisplayName>
-        <AccountId>1176</AccountId>
-        <AccountType/>
-      </UserInfo>
-    </SharedWithUsers>
-  </documentManagement>
-</p:properties>
-</file>
-
-<file path=customXml/item4.xml><?xml version="1.0" encoding="utf-8"?>
-<p:properties xmlns:p="http://schemas.microsoft.com/office/2006/metadata/properties" xmlns:xsi="http://www.w3.org/2001/XMLSchema-instance" xmlns:pc="http://schemas.microsoft.com/office/infopath/2007/PartnerControls">
-  <documentManagement>
-    <SharedWithUsers xmlns="83cd2334-221a-48c3-9034-bfd1542dfe28">
-      <UserInfo>
-        <DisplayName>Gilad Turbahn</DisplayName>
-        <AccountId>511</AccountId>
-        <AccountType/>
-      </UserInfo>
-      <UserInfo>
-        <DisplayName>Keith Boyd</DisplayName>
-        <AccountId>993</AccountId>
-        <AccountType/>
-      </UserInfo>
-      <UserInfo>
-        <DisplayName>Christopher Harrison</DisplayName>
-        <AccountId>1176</AccountId>
-        <AccountType/>
-      </UserInfo>
-    </SharedWithUsers>
-  </documentManagement>
-</p:properties>
-</file>
-
-<file path=customXml/item40.xml><?xml version="1.0" encoding="utf-8"?>
-<Control xmlns="http://schemas.microsoft.com/VisualStudio/2011/storyboarding/control">
-  <Id Name="a53d73d2-368b-429e-b817-1324eec1382c" Revision="1" Stencil="7276b9ef-3953-4dce-a89b-ed85f20b8b93" StencilVersion="1.0"/>
-</Control>
-</file>
-
-<file path=customXml/item41.xml><?xml version="1.0" encoding="utf-8"?>
-<Control xmlns="http://schemas.microsoft.com/VisualStudio/2011/storyboarding/control">
-  <Id Name="a2191c86-fc50-4add-948c-129f6b5a88d8" Revision="1" Stencil="7276b9ef-3953-4dce-a89b-ed85f20b8b93" StencilVersion="1.0"/>
-</Control>
-</file>
-
-<file path=customXml/item42.xml><?xml version="1.0" encoding="utf-8"?>
-<Control xmlns="http://schemas.microsoft.com/VisualStudio/2011/storyboarding/control">
-  <Id Name="a2191c86-fc50-4add-948c-129f6b5a88d8" Revision="1" Stencil="7276b9ef-3953-4dce-a89b-ed85f20b8b93" StencilVersion="1.0"/>
-</Control>
-</file>
-
-<file path=customXml/item43.xml><?xml version="1.0" encoding="utf-8"?>
-<?mso-contentType ?>
-<FormTemplates xmlns="http://schemas.microsoft.com/sharepoint/v3/contenttype/forms">
-  <Display>DocumentLibraryForm</Display>
-  <Edit>DocumentLibraryForm</Edit>
-  <New>DocumentLibraryForm</New>
-</FormTemplates>
-</file>
-
-<file path=customXml/item44.xml><?xml version="1.0" encoding="utf-8"?>
-<p:properties xmlns:p="http://schemas.microsoft.com/office/2006/metadata/properties" xmlns:xsi="http://www.w3.org/2001/XMLSchema-instance" xmlns:pc="http://schemas.microsoft.com/office/infopath/2007/PartnerControls">
-  <documentManagement>
-    <SharedWithUsers xmlns="83cd2334-221a-48c3-9034-bfd1542dfe28">
-      <UserInfo>
-        <DisplayName>Gilad Turbahn</DisplayName>
-        <AccountId>511</AccountId>
-        <AccountType/>
-      </UserInfo>
-      <UserInfo>
-        <DisplayName>Keith Boyd</DisplayName>
-        <AccountId>993</AccountId>
-        <AccountType/>
-      </UserInfo>
-      <UserInfo>
-        <DisplayName>Christopher Harrison</DisplayName>
-        <AccountId>1176</AccountId>
-        <AccountType/>
-      </UserInfo>
-    </SharedWithUsers>
-  </documentManagement>
-</p:properties>
-</file>
-
-<file path=customXml/item45.xml><?xml version="1.0" encoding="utf-8"?>
-<Control xmlns="http://schemas.microsoft.com/VisualStudio/2011/storyboarding/control">
-  <Id Name="a53d73d2-368b-429e-b817-1324eec1382c" Revision="1" Stencil="7276b9ef-3953-4dce-a89b-ed85f20b8b93" StencilVersion="1.0"/>
-</Control>
-</file>
-
-<file path=customXml/item46.xml><?xml version="1.0" encoding="utf-8"?>
-<Control xmlns="http://schemas.microsoft.com/VisualStudio/2011/storyboarding/control">
-  <Id Name="369f9055-6b6c-48b9-9320-5df2d46c430a" Revision="1" Stencil="7276b9ef-3953-4dce-a89b-ed85f20b8b93" StencilVersion="1.0"/>
-</Control>
-</file>
-
-<file path=customXml/item47.xml><?xml version="1.0" encoding="utf-8"?>
-<Control xmlns="http://schemas.microsoft.com/VisualStudio/2011/storyboarding/control">
-  <Id Name="a2191c86-fc50-4add-948c-129f6b5a88d8" Revision="1" Stencil="7276b9ef-3953-4dce-a89b-ed85f20b8b93" StencilVersion="1.0"/>
-</Control>
-</file>
-
-<file path=customXml/item5.xml><?xml version="1.0" encoding="utf-8"?>
-<?mso-contentType ?>
-<FormTemplates xmlns="http://schemas.microsoft.com/sharepoint/v3/contenttype/forms">
-  <Display>DocumentLibraryForm</Display>
-  <Edit>DocumentLibraryForm</Edit>
-  <New>DocumentLibraryForm</New>
-</FormTemplates>
-</file>
-
-<file path=customXml/item6.xml><?xml version="1.0" encoding="utf-8"?>
-<?mso-contentType ?>
-<FormTemplates xmlns="http://schemas.microsoft.com/sharepoint/v3/contenttype/forms">
-  <Display>DocumentLibraryForm</Display>
-  <Edit>DocumentLibraryForm</Edit>
-  <New>DocumentLibraryForm</New>
-</FormTemplates>
-</file>
-
-<file path=customXml/item7.xml><?xml version="1.0" encoding="utf-8"?>
-<p:properties xmlns:p="http://schemas.microsoft.com/office/2006/metadata/properties" xmlns:xsi="http://www.w3.org/2001/XMLSchema-instance" xmlns:pc="http://schemas.microsoft.com/office/infopath/2007/PartnerControls">
-  <documentManagement>
-    <SharedWithUsers xmlns="83cd2334-221a-48c3-9034-bfd1542dfe28">
-      <UserInfo>
-        <DisplayName>Gilad Turbahn</DisplayName>
-        <AccountId>511</AccountId>
-        <AccountType/>
-      </UserInfo>
-      <UserInfo>
-        <DisplayName>Keith Boyd</DisplayName>
-        <AccountId>993</AccountId>
-        <AccountType/>
-      </UserInfo>
-      <UserInfo>
-        <DisplayName>Christopher Harrison</DisplayName>
-        <AccountId>1176</AccountId>
-        <AccountType/>
-      </UserInfo>
-    </SharedWithUsers>
-  </documentManagement>
-</p:properties>
-</file>
-
-<file path=customXml/item8.xml><?xml version="1.0" encoding="utf-8"?>
-<Control xmlns="http://schemas.microsoft.com/VisualStudio/2011/storyboarding/control">
-  <Id Name="369f9055-6b6c-48b9-9320-5df2d46c430a" Revision="1" Stencil="7276b9ef-3953-4dce-a89b-ed85f20b8b93" StencilVersion="1.0"/>
-</Control>
-</file>
-
-<file path=customXml/item9.xml><?xml version="1.0" encoding="utf-8"?>
-<Control xmlns="http://schemas.microsoft.com/VisualStudio/2011/storyboarding/control">
-  <Id Name="a53d73d2-368b-429e-b817-1324eec1382c" Revision="1" Stencil="7276b9ef-3953-4dce-a89b-ed85f20b8b93" StencilVersion="1.0"/>
-</Control>
-</file>
-
 <file path=customXml/itemProps1.xml><?xml version="1.0" encoding="utf-8"?>
-<ds:datastoreItem xmlns:ds="http://schemas.openxmlformats.org/officeDocument/2006/customXml" ds:itemID="{4C1B3C27-4803-4D72-A3F8-6668A3F0A24B}">
+<ds:datastoreItem xmlns:ds="http://schemas.openxmlformats.org/officeDocument/2006/customXml" ds:itemID="{78436128-120F-440C-B7DE-5C2E6A2F2A96}">
   <ds:schemaRefs>
-    <ds:schemaRef ds:uri="http://schemas.microsoft.com/VisualStudio/2011/storyboarding/control"/>
+    <ds:schemaRef ds:uri="http://schemas.microsoft.com/sharepoint/v3/contenttype/forms"/>
   </ds:schemaRefs>
 </ds:datastoreItem>
 </file>
 
 <file path=customXml/itemProps10.xml><?xml version="1.0" encoding="utf-8"?>
-<ds:datastoreItem xmlns:ds="http://schemas.openxmlformats.org/officeDocument/2006/customXml" ds:itemID="{C0F92A87-A216-45A9-B9C0-0515663D35BF}">
+<ds:datastoreItem xmlns:ds="http://schemas.openxmlformats.org/officeDocument/2006/customXml" ds:itemID="{82DB428A-B8F8-483F-8276-095629A8ECDB}">
   <ds:schemaRefs>
     <ds:schemaRef ds:uri="http://schemas.microsoft.com/VisualStudio/2011/storyboarding/control"/>
   </ds:schemaRefs>
@@ -44579,6 +45318,138 @@
 </file>
 
 <file path=customXml/itemProps12.xml><?xml version="1.0" encoding="utf-8"?>
+<ds:datastoreItem xmlns:ds="http://schemas.openxmlformats.org/officeDocument/2006/customXml" ds:itemID="{08C4EE12-DF69-4FFC-9E40-C7991F3490A6}">
+  <ds:schemaRefs>
+    <ds:schemaRef ds:uri="http://schemas.microsoft.com/VisualStudio/2011/storyboarding/control"/>
+  </ds:schemaRefs>
+</ds:datastoreItem>
+</file>
+
+<file path=customXml/itemProps13.xml><?xml version="1.0" encoding="utf-8"?>
+<ds:datastoreItem xmlns:ds="http://schemas.openxmlformats.org/officeDocument/2006/customXml" ds:itemID="{FE651ABA-5DC1-4ABD-A06E-055AE54B337B}">
+  <ds:schemaRefs>
+    <ds:schemaRef ds:uri="http://schemas.microsoft.com/VisualStudio/2011/storyboarding/control"/>
+  </ds:schemaRefs>
+</ds:datastoreItem>
+</file>
+
+<file path=customXml/itemProps14.xml><?xml version="1.0" encoding="utf-8"?>
+<ds:datastoreItem xmlns:ds="http://schemas.openxmlformats.org/officeDocument/2006/customXml" ds:itemID="{E692D73E-1478-4790-BEEC-C5C534998F40}">
+  <ds:schemaRefs>
+    <ds:schemaRef ds:uri="http://schemas.microsoft.com/office/2006/metadata/properties"/>
+    <ds:schemaRef ds:uri="http://schemas.microsoft.com/office/infopath/2007/PartnerControls"/>
+    <ds:schemaRef ds:uri="83cd2334-221a-48c3-9034-bfd1542dfe28"/>
+  </ds:schemaRefs>
+</ds:datastoreItem>
+</file>
+
+<file path=customXml/itemProps15.xml><?xml version="1.0" encoding="utf-8"?>
+<ds:datastoreItem xmlns:ds="http://schemas.openxmlformats.org/officeDocument/2006/customXml" ds:itemID="{21F6B647-976A-41D0-B760-9DF9DFC6AE3C}">
+  <ds:schemaRefs>
+    <ds:schemaRef ds:uri="http://schemas.microsoft.com/VisualStudio/2011/storyboarding/control"/>
+  </ds:schemaRefs>
+</ds:datastoreItem>
+</file>
+
+<file path=customXml/itemProps16.xml><?xml version="1.0" encoding="utf-8"?>
+<ds:datastoreItem xmlns:ds="http://schemas.openxmlformats.org/officeDocument/2006/customXml" ds:itemID="{4E805D65-1532-4BB0-8F41-8013167C0009}">
+  <ds:schemaRefs>
+    <ds:schemaRef ds:uri="http://schemas.microsoft.com/VisualStudio/2011/storyboarding/control"/>
+  </ds:schemaRefs>
+</ds:datastoreItem>
+</file>
+
+<file path=customXml/itemProps17.xml><?xml version="1.0" encoding="utf-8"?>
+<ds:datastoreItem xmlns:ds="http://schemas.openxmlformats.org/officeDocument/2006/customXml" ds:itemID="{758FDAC0-319D-4A54-8D8E-1D42CB1F8004}">
+  <ds:schemaRefs>
+    <ds:schemaRef ds:uri="http://schemas.microsoft.com/sharepoint/v3/contenttype/forms"/>
+  </ds:schemaRefs>
+</ds:datastoreItem>
+</file>
+
+<file path=customXml/itemProps18.xml><?xml version="1.0" encoding="utf-8"?>
+<ds:datastoreItem xmlns:ds="http://schemas.openxmlformats.org/officeDocument/2006/customXml" ds:itemID="{42D603BF-B513-4201-A599-21BA0F4FFC40}">
+  <ds:schemaRefs>
+    <ds:schemaRef ds:uri="http://schemas.microsoft.com/VisualStudio/2011/storyboarding/control"/>
+  </ds:schemaRefs>
+</ds:datastoreItem>
+</file>
+
+<file path=customXml/itemProps19.xml><?xml version="1.0" encoding="utf-8"?>
+<ds:datastoreItem xmlns:ds="http://schemas.openxmlformats.org/officeDocument/2006/customXml" ds:itemID="{ED350DFE-2319-4AB0-BC96-1D36D125365A}">
+  <ds:schemaRefs>
+    <ds:schemaRef ds:uri="http://schemas.microsoft.com/VisualStudio/2011/storyboarding/control"/>
+  </ds:schemaRefs>
+</ds:datastoreItem>
+</file>
+
+<file path=customXml/itemProps2.xml><?xml version="1.0" encoding="utf-8"?>
+<ds:datastoreItem xmlns:ds="http://schemas.openxmlformats.org/officeDocument/2006/customXml" ds:itemID="{857A7473-18B7-454F-9A7C-6410FE8392A5}">
+  <ds:schemaRefs>
+    <ds:schemaRef ds:uri="http://schemas.microsoft.com/office/2006/metadata/properties"/>
+    <ds:schemaRef ds:uri="http://schemas.microsoft.com/office/infopath/2007/PartnerControls"/>
+    <ds:schemaRef ds:uri="83cd2334-221a-48c3-9034-bfd1542dfe28"/>
+  </ds:schemaRefs>
+</ds:datastoreItem>
+</file>
+
+<file path=customXml/itemProps20.xml><?xml version="1.0" encoding="utf-8"?>
+<ds:datastoreItem xmlns:ds="http://schemas.openxmlformats.org/officeDocument/2006/customXml" ds:itemID="{67213E6F-7B96-4222-888B-63710B06D885}">
+  <ds:schemaRefs>
+    <ds:schemaRef ds:uri="http://schemas.microsoft.com/VisualStudio/2011/storyboarding/control"/>
+  </ds:schemaRefs>
+</ds:datastoreItem>
+</file>
+
+<file path=customXml/itemProps21.xml><?xml version="1.0" encoding="utf-8"?>
+<ds:datastoreItem xmlns:ds="http://schemas.openxmlformats.org/officeDocument/2006/customXml" ds:itemID="{D6FEE829-2115-45B4-8110-670FD454542B}">
+  <ds:schemaRefs>
+    <ds:schemaRef ds:uri="http://schemas.microsoft.com/VisualStudio/2011/storyboarding/control"/>
+  </ds:schemaRefs>
+</ds:datastoreItem>
+</file>
+
+<file path=customXml/itemProps22.xml><?xml version="1.0" encoding="utf-8"?>
+<ds:datastoreItem xmlns:ds="http://schemas.openxmlformats.org/officeDocument/2006/customXml" ds:itemID="{1EF25EC2-965B-4491-9691-6B806C9E3B8B}">
+  <ds:schemaRefs>
+    <ds:schemaRef ds:uri="http://schemas.microsoft.com/sharepoint/v3/contenttype/forms"/>
+  </ds:schemaRefs>
+</ds:datastoreItem>
+</file>
+
+<file path=customXml/itemProps23.xml><?xml version="1.0" encoding="utf-8"?>
+<ds:datastoreItem xmlns:ds="http://schemas.openxmlformats.org/officeDocument/2006/customXml" ds:itemID="{432851C6-BC05-4673-B853-6D08AB80CDC4}">
+  <ds:schemaRefs>
+    <ds:schemaRef ds:uri="http://schemas.microsoft.com/VisualStudio/2011/storyboarding/control"/>
+  </ds:schemaRefs>
+</ds:datastoreItem>
+</file>
+
+<file path=customXml/itemProps24.xml><?xml version="1.0" encoding="utf-8"?>
+<ds:datastoreItem xmlns:ds="http://schemas.openxmlformats.org/officeDocument/2006/customXml" ds:itemID="{4B608A51-347D-40FD-BFCF-C0BBBB6DE38F}">
+  <ds:schemaRefs>
+    <ds:schemaRef ds:uri="http://schemas.microsoft.com/sharepoint/v3/contenttype/forms"/>
+  </ds:schemaRefs>
+</ds:datastoreItem>
+</file>
+
+<file path=customXml/itemProps25.xml><?xml version="1.0" encoding="utf-8"?>
+<ds:datastoreItem xmlns:ds="http://schemas.openxmlformats.org/officeDocument/2006/customXml" ds:itemID="{38217AA1-CC95-49A9-B284-2ED4D347D7CA}">
+  <ds:schemaRefs>
+    <ds:schemaRef ds:uri="http://schemas.microsoft.com/VisualStudio/2011/storyboarding/control"/>
+  </ds:schemaRefs>
+</ds:datastoreItem>
+</file>
+
+<file path=customXml/itemProps26.xml><?xml version="1.0" encoding="utf-8"?>
+<ds:datastoreItem xmlns:ds="http://schemas.openxmlformats.org/officeDocument/2006/customXml" ds:itemID="{376216F9-AF6B-4844-AE8C-B9F953F916AB}">
+  <ds:schemaRefs>
+    <ds:schemaRef ds:uri="http://schemas.microsoft.com/VisualStudio/2011/storyboarding/control"/>
+  </ds:schemaRefs>
+</ds:datastoreItem>
+</file>
+
+<file path=customXml/itemProps27.xml><?xml version="1.0" encoding="utf-8"?>
 <ds:datastoreItem xmlns:ds="http://schemas.openxmlformats.org/officeDocument/2006/customXml" ds:itemID="{EFC12748-212C-48FE-A5F8-D78A8D21E838}">
   <ds:schemaRefs>
     <ds:schemaRef ds:uri="http://schemas.microsoft.com/sharepoint/v3/contenttype/forms"/>
@@ -44586,23 +45457,89 @@
 </ds:datastoreItem>
 </file>
 
-<file path=customXml/itemProps13.xml><?xml version="1.0" encoding="utf-8"?>
-<ds:datastoreItem xmlns:ds="http://schemas.openxmlformats.org/officeDocument/2006/customXml" ds:itemID="{3DC6CABD-46E1-4C27-A0B3-616DC56F8E5C}">
+<file path=customXml/itemProps28.xml><?xml version="1.0" encoding="utf-8"?>
+<ds:datastoreItem xmlns:ds="http://schemas.openxmlformats.org/officeDocument/2006/customXml" ds:itemID="{366CA990-F93D-4100-9654-65D9E30F4E1C}">
   <ds:schemaRefs>
     <ds:schemaRef ds:uri="http://schemas.microsoft.com/VisualStudio/2011/storyboarding/control"/>
   </ds:schemaRefs>
 </ds:datastoreItem>
 </file>
 
-<file path=customXml/itemProps14.xml><?xml version="1.0" encoding="utf-8"?>
-<ds:datastoreItem xmlns:ds="http://schemas.openxmlformats.org/officeDocument/2006/customXml" ds:itemID="{ED350DFE-2319-4AB0-BC96-1D36D125365A}">
+<file path=customXml/itemProps29.xml><?xml version="1.0" encoding="utf-8"?>
+<ds:datastoreItem xmlns:ds="http://schemas.openxmlformats.org/officeDocument/2006/customXml" ds:itemID="{8BD595CA-AC5E-43B9-B966-E468A16E8322}">
   <ds:schemaRefs>
     <ds:schemaRef ds:uri="http://schemas.microsoft.com/VisualStudio/2011/storyboarding/control"/>
   </ds:schemaRefs>
 </ds:datastoreItem>
 </file>
 
-<file path=customXml/itemProps15.xml><?xml version="1.0" encoding="utf-8"?>
+<file path=customXml/itemProps3.xml><?xml version="1.0" encoding="utf-8"?>
+<ds:datastoreItem xmlns:ds="http://schemas.openxmlformats.org/officeDocument/2006/customXml" ds:itemID="{B5105A87-47B6-44F6-97FD-4619C0556604}">
+  <ds:schemaRefs>
+    <ds:schemaRef ds:uri="http://schemas.microsoft.com/VisualStudio/2011/storyboarding/control"/>
+  </ds:schemaRefs>
+</ds:datastoreItem>
+</file>
+
+<file path=customXml/itemProps30.xml><?xml version="1.0" encoding="utf-8"?>
+<ds:datastoreItem xmlns:ds="http://schemas.openxmlformats.org/officeDocument/2006/customXml" ds:itemID="{F990F116-B58F-4255-B05B-DA3808E0E5C6}">
+  <ds:schemaRefs>
+    <ds:schemaRef ds:uri="http://schemas.microsoft.com/office/2006/metadata/properties"/>
+    <ds:schemaRef ds:uri="http://schemas.microsoft.com/office/infopath/2007/PartnerControls"/>
+    <ds:schemaRef ds:uri="83cd2334-221a-48c3-9034-bfd1542dfe28"/>
+  </ds:schemaRefs>
+</ds:datastoreItem>
+</file>
+
+<file path=customXml/itemProps31.xml><?xml version="1.0" encoding="utf-8"?>
+<ds:datastoreItem xmlns:ds="http://schemas.openxmlformats.org/officeDocument/2006/customXml" ds:itemID="{6304ED5A-D144-48FA-AD30-480C1D48DEBD}">
+  <ds:schemaRefs>
+    <ds:schemaRef ds:uri="http://schemas.microsoft.com/sharepoint/v3/contenttype/forms"/>
+  </ds:schemaRefs>
+</ds:datastoreItem>
+</file>
+
+<file path=customXml/itemProps32.xml><?xml version="1.0" encoding="utf-8"?>
+<ds:datastoreItem xmlns:ds="http://schemas.openxmlformats.org/officeDocument/2006/customXml" ds:itemID="{7959CC6A-F423-4783-B968-3BCC86A7394E}">
+  <ds:schemaRefs>
+    <ds:schemaRef ds:uri="http://schemas.microsoft.com/VisualStudio/2011/storyboarding/control"/>
+  </ds:schemaRefs>
+</ds:datastoreItem>
+</file>
+
+<file path=customXml/itemProps33.xml><?xml version="1.0" encoding="utf-8"?>
+<ds:datastoreItem xmlns:ds="http://schemas.openxmlformats.org/officeDocument/2006/customXml" ds:itemID="{0282FB20-2D4C-459D-8468-77D1D3C6925D}">
+  <ds:schemaRefs>
+    <ds:schemaRef ds:uri="http://schemas.microsoft.com/VisualStudio/2011/storyboarding/control"/>
+  </ds:schemaRefs>
+</ds:datastoreItem>
+</file>
+
+<file path=customXml/itemProps34.xml><?xml version="1.0" encoding="utf-8"?>
+<ds:datastoreItem xmlns:ds="http://schemas.openxmlformats.org/officeDocument/2006/customXml" ds:itemID="{D4B5F268-5930-44CD-BDF1-D0A04D4BBC1C}">
+  <ds:schemaRefs>
+    <ds:schemaRef ds:uri="http://schemas.microsoft.com/VisualStudio/2011/storyboarding/control"/>
+  </ds:schemaRefs>
+</ds:datastoreItem>
+</file>
+
+<file path=customXml/itemProps35.xml><?xml version="1.0" encoding="utf-8"?>
+<ds:datastoreItem xmlns:ds="http://schemas.openxmlformats.org/officeDocument/2006/customXml" ds:itemID="{4C1B3C27-4803-4D72-A3F8-6668A3F0A24B}">
+  <ds:schemaRefs>
+    <ds:schemaRef ds:uri="http://schemas.microsoft.com/VisualStudio/2011/storyboarding/control"/>
+  </ds:schemaRefs>
+</ds:datastoreItem>
+</file>
+
+<file path=customXml/itemProps36.xml><?xml version="1.0" encoding="utf-8"?>
+<ds:datastoreItem xmlns:ds="http://schemas.openxmlformats.org/officeDocument/2006/customXml" ds:itemID="{9360AFB9-8F99-4E1B-878D-F2EBABEB164C}">
+  <ds:schemaRefs>
+    <ds:schemaRef ds:uri="http://schemas.microsoft.com/sharepoint/v3/contenttype/forms"/>
+  </ds:schemaRefs>
+</ds:datastoreItem>
+</file>
+
+<file path=customXml/itemProps37.xml><?xml version="1.0" encoding="utf-8"?>
 <ds:datastoreItem xmlns:ds="http://schemas.openxmlformats.org/officeDocument/2006/customXml" ds:itemID="{2913841C-A564-4F3E-8A3C-33213285300D}">
   <ds:schemaRefs>
     <ds:schemaRef ds:uri="http://schemas.microsoft.com/office/2006/metadata/properties"/>
@@ -44612,23 +45549,93 @@
 </ds:datastoreItem>
 </file>
 
-<file path=customXml/itemProps16.xml><?xml version="1.0" encoding="utf-8"?>
-<ds:datastoreItem xmlns:ds="http://schemas.openxmlformats.org/officeDocument/2006/customXml" ds:itemID="{C63AC2F0-1DEB-4E91-A88A-7A014A172F4F}">
+<file path=customXml/itemProps38.xml><?xml version="1.0" encoding="utf-8"?>
+<ds:datastoreItem xmlns:ds="http://schemas.openxmlformats.org/officeDocument/2006/customXml" ds:itemID="{F68D8396-E21C-4AFF-8FDD-70D00673D0EE}">
   <ds:schemaRefs>
     <ds:schemaRef ds:uri="http://schemas.microsoft.com/VisualStudio/2011/storyboarding/control"/>
   </ds:schemaRefs>
 </ds:datastoreItem>
 </file>
 
-<file path=customXml/itemProps17.xml><?xml version="1.0" encoding="utf-8"?>
-<ds:datastoreItem xmlns:ds="http://schemas.openxmlformats.org/officeDocument/2006/customXml" ds:itemID="{366CA990-F93D-4100-9654-65D9E30F4E1C}">
+<file path=customXml/itemProps39.xml><?xml version="1.0" encoding="utf-8"?>
+<ds:datastoreItem xmlns:ds="http://schemas.openxmlformats.org/officeDocument/2006/customXml" ds:itemID="{5356B21E-62AB-45D9-B99D-177E6D959AE1}">
+  <ds:schemaRefs>
+    <ds:schemaRef ds:uri="http://schemas.microsoft.com/sharepoint/v3/contenttype/forms"/>
+  </ds:schemaRefs>
+</ds:datastoreItem>
+</file>
+
+<file path=customXml/itemProps4.xml><?xml version="1.0" encoding="utf-8"?>
+<ds:datastoreItem xmlns:ds="http://schemas.openxmlformats.org/officeDocument/2006/customXml" ds:itemID="{B76ED3FE-E88C-4961-A59E-A34F608A3C73}">
+  <ds:schemaRefs>
+    <ds:schemaRef ds:uri="http://schemas.microsoft.com/office/2006/metadata/properties"/>
+    <ds:schemaRef ds:uri="http://schemas.microsoft.com/office/infopath/2007/PartnerControls"/>
+    <ds:schemaRef ds:uri="83cd2334-221a-48c3-9034-bfd1542dfe28"/>
+  </ds:schemaRefs>
+</ds:datastoreItem>
+</file>
+
+<file path=customXml/itemProps40.xml><?xml version="1.0" encoding="utf-8"?>
+<ds:datastoreItem xmlns:ds="http://schemas.openxmlformats.org/officeDocument/2006/customXml" ds:itemID="{6FB9D450-4C47-4A44-8C0D-C78D8A54C46F}">
   <ds:schemaRefs>
     <ds:schemaRef ds:uri="http://schemas.microsoft.com/VisualStudio/2011/storyboarding/control"/>
   </ds:schemaRefs>
 </ds:datastoreItem>
 </file>
 
-<file path=customXml/itemProps18.xml><?xml version="1.0" encoding="utf-8"?>
+<file path=customXml/itemProps41.xml><?xml version="1.0" encoding="utf-8"?>
+<ds:datastoreItem xmlns:ds="http://schemas.openxmlformats.org/officeDocument/2006/customXml" ds:itemID="{C0F92A87-A216-45A9-B9C0-0515663D35BF}">
+  <ds:schemaRefs>
+    <ds:schemaRef ds:uri="http://schemas.microsoft.com/VisualStudio/2011/storyboarding/control"/>
+  </ds:schemaRefs>
+</ds:datastoreItem>
+</file>
+
+<file path=customXml/itemProps42.xml><?xml version="1.0" encoding="utf-8"?>
+<ds:datastoreItem xmlns:ds="http://schemas.openxmlformats.org/officeDocument/2006/customXml" ds:itemID="{4E8278DB-3CDD-48A7-992E-A7596AD335B9}">
+  <ds:schemaRefs>
+    <ds:schemaRef ds:uri="http://schemas.microsoft.com/VisualStudio/2011/storyboarding/control"/>
+  </ds:schemaRefs>
+</ds:datastoreItem>
+</file>
+
+<file path=customXml/itemProps43.xml><?xml version="1.0" encoding="utf-8"?>
+<ds:datastoreItem xmlns:ds="http://schemas.openxmlformats.org/officeDocument/2006/customXml" ds:itemID="{18966F1F-DC2A-460D-B918-D3DF54AC7FCE}">
+  <ds:schemaRefs>
+    <ds:schemaRef ds:uri="http://schemas.microsoft.com/office/2006/metadata/properties"/>
+    <ds:schemaRef ds:uri="http://schemas.microsoft.com/office/infopath/2007/PartnerControls"/>
+    <ds:schemaRef ds:uri="83cd2334-221a-48c3-9034-bfd1542dfe28"/>
+  </ds:schemaRefs>
+</ds:datastoreItem>
+</file>
+
+<file path=customXml/itemProps44.xml><?xml version="1.0" encoding="utf-8"?>
+<ds:datastoreItem xmlns:ds="http://schemas.openxmlformats.org/officeDocument/2006/customXml" ds:itemID="{40746530-DDF2-4991-9C3E-4E8481CBC22A}">
+  <ds:schemaRefs>
+    <ds:schemaRef ds:uri="http://schemas.microsoft.com/office/2006/metadata/properties"/>
+    <ds:schemaRef ds:uri="http://schemas.microsoft.com/office/infopath/2007/PartnerControls"/>
+    <ds:schemaRef ds:uri="83cd2334-221a-48c3-9034-bfd1542dfe28"/>
+  </ds:schemaRefs>
+</ds:datastoreItem>
+</file>
+
+<file path=customXml/itemProps45.xml><?xml version="1.0" encoding="utf-8"?>
+<ds:datastoreItem xmlns:ds="http://schemas.openxmlformats.org/officeDocument/2006/customXml" ds:itemID="{8893E80D-6D0C-4E0F-AA22-E5615BB87E5B}">
+  <ds:schemaRefs>
+    <ds:schemaRef ds:uri="http://schemas.microsoft.com/VisualStudio/2011/storyboarding/control"/>
+  </ds:schemaRefs>
+</ds:datastoreItem>
+</file>
+
+<file path=customXml/itemProps46.xml><?xml version="1.0" encoding="utf-8"?>
+<ds:datastoreItem xmlns:ds="http://schemas.openxmlformats.org/officeDocument/2006/customXml" ds:itemID="{3DC6CABD-46E1-4C27-A0B3-616DC56F8E5C}">
+  <ds:schemaRefs>
+    <ds:schemaRef ds:uri="http://schemas.microsoft.com/VisualStudio/2011/storyboarding/control"/>
+  </ds:schemaRefs>
+</ds:datastoreItem>
+</file>
+
+<file path=customXml/itemProps47.xml><?xml version="1.0" encoding="utf-8"?>
 <ds:datastoreItem xmlns:ds="http://schemas.openxmlformats.org/officeDocument/2006/customXml" ds:itemID="{4B16F4FE-7C26-4443-B426-81998D23ED87}">
   <ds:schemaRefs>
     <ds:schemaRef ds:uri="http://schemas.microsoft.com/VisualStudio/2011/storyboarding/control"/>
@@ -44636,15 +45643,33 @@
 </ds:datastoreItem>
 </file>
 
-<file path=customXml/itemProps19.xml><?xml version="1.0" encoding="utf-8"?>
-<ds:datastoreItem xmlns:ds="http://schemas.openxmlformats.org/officeDocument/2006/customXml" ds:itemID="{42D603BF-B513-4201-A599-21BA0F4FFC40}">
+<file path=customXml/itemProps5.xml><?xml version="1.0" encoding="utf-8"?>
+<ds:datastoreItem xmlns:ds="http://schemas.openxmlformats.org/officeDocument/2006/customXml" ds:itemID="{8257D6BC-B71E-4D95-81E4-A1D4A8174168}">
   <ds:schemaRefs>
     <ds:schemaRef ds:uri="http://schemas.microsoft.com/VisualStudio/2011/storyboarding/control"/>
   </ds:schemaRefs>
 </ds:datastoreItem>
 </file>
 
-<file path=customXml/itemProps2.xml><?xml version="1.0" encoding="utf-8"?>
+<file path=customXml/itemProps6.xml><?xml version="1.0" encoding="utf-8"?>
+<ds:datastoreItem xmlns:ds="http://schemas.openxmlformats.org/officeDocument/2006/customXml" ds:itemID="{0B54C583-7BAB-4080-8093-C5F84F5A225A}">
+  <ds:schemaRefs>
+    <ds:schemaRef ds:uri="http://schemas.microsoft.com/VisualStudio/2011/storyboarding/control"/>
+  </ds:schemaRefs>
+</ds:datastoreItem>
+</file>
+
+<file path=customXml/itemProps7.xml><?xml version="1.0" encoding="utf-8"?>
+<ds:datastoreItem xmlns:ds="http://schemas.openxmlformats.org/officeDocument/2006/customXml" ds:itemID="{473A6A21-7521-4B81-9336-9B587BA12275}">
+  <ds:schemaRefs>
+    <ds:schemaRef ds:uri="http://schemas.microsoft.com/office/2006/metadata/properties"/>
+    <ds:schemaRef ds:uri="http://schemas.microsoft.com/office/infopath/2007/PartnerControls"/>
+    <ds:schemaRef ds:uri="83cd2334-221a-48c3-9034-bfd1542dfe28"/>
+  </ds:schemaRefs>
+</ds:datastoreItem>
+</file>
+
+<file path=customXml/itemProps8.xml><?xml version="1.0" encoding="utf-8"?>
 <ds:datastoreItem xmlns:ds="http://schemas.openxmlformats.org/officeDocument/2006/customXml" ds:itemID="{11F98F69-7518-4AE2-AE7B-E037DC9DDC97}">
   <ds:schemaRefs>
     <ds:schemaRef ds:uri="http://schemas.microsoft.com/office/2006/metadata/contentType"/>
@@ -44662,294 +45687,8 @@
 </ds:datastoreItem>
 </file>
 
-<file path=customXml/itemProps20.xml><?xml version="1.0" encoding="utf-8"?>
-<ds:datastoreItem xmlns:ds="http://schemas.openxmlformats.org/officeDocument/2006/customXml" ds:itemID="{0282FB20-2D4C-459D-8468-77D1D3C6925D}">
-  <ds:schemaRefs>
-    <ds:schemaRef ds:uri="http://schemas.microsoft.com/VisualStudio/2011/storyboarding/control"/>
-  </ds:schemaRefs>
-</ds:datastoreItem>
-</file>
-
-<file path=customXml/itemProps21.xml><?xml version="1.0" encoding="utf-8"?>
-<ds:datastoreItem xmlns:ds="http://schemas.openxmlformats.org/officeDocument/2006/customXml" ds:itemID="{B5105A87-47B6-44F6-97FD-4619C0556604}">
-  <ds:schemaRefs>
-    <ds:schemaRef ds:uri="http://schemas.microsoft.com/VisualStudio/2011/storyboarding/control"/>
-  </ds:schemaRefs>
-</ds:datastoreItem>
-</file>
-
-<file path=customXml/itemProps22.xml><?xml version="1.0" encoding="utf-8"?>
-<ds:datastoreItem xmlns:ds="http://schemas.openxmlformats.org/officeDocument/2006/customXml" ds:itemID="{67213E6F-7B96-4222-888B-63710B06D885}">
-  <ds:schemaRefs>
-    <ds:schemaRef ds:uri="http://schemas.microsoft.com/VisualStudio/2011/storyboarding/control"/>
-  </ds:schemaRefs>
-</ds:datastoreItem>
-</file>
-
-<file path=customXml/itemProps23.xml><?xml version="1.0" encoding="utf-8"?>
-<ds:datastoreItem xmlns:ds="http://schemas.openxmlformats.org/officeDocument/2006/customXml" ds:itemID="{F68D8396-E21C-4AFF-8FDD-70D00673D0EE}">
-  <ds:schemaRefs>
-    <ds:schemaRef ds:uri="http://schemas.microsoft.com/VisualStudio/2011/storyboarding/control"/>
-  </ds:schemaRefs>
-</ds:datastoreItem>
-</file>
-
-<file path=customXml/itemProps24.xml><?xml version="1.0" encoding="utf-8"?>
-<ds:datastoreItem xmlns:ds="http://schemas.openxmlformats.org/officeDocument/2006/customXml" ds:itemID="{08C4EE12-DF69-4FFC-9E40-C7991F3490A6}">
-  <ds:schemaRefs>
-    <ds:schemaRef ds:uri="http://schemas.microsoft.com/VisualStudio/2011/storyboarding/control"/>
-  </ds:schemaRefs>
-</ds:datastoreItem>
-</file>
-
-<file path=customXml/itemProps25.xml><?xml version="1.0" encoding="utf-8"?>
-<ds:datastoreItem xmlns:ds="http://schemas.openxmlformats.org/officeDocument/2006/customXml" ds:itemID="{8BD595CA-AC5E-43B9-B966-E468A16E8322}">
-  <ds:schemaRefs>
-    <ds:schemaRef ds:uri="http://schemas.microsoft.com/VisualStudio/2011/storyboarding/control"/>
-  </ds:schemaRefs>
-</ds:datastoreItem>
-</file>
-
-<file path=customXml/itemProps26.xml><?xml version="1.0" encoding="utf-8"?>
-<ds:datastoreItem xmlns:ds="http://schemas.openxmlformats.org/officeDocument/2006/customXml" ds:itemID="{78436128-120F-440C-B7DE-5C2E6A2F2A96}">
-  <ds:schemaRefs>
-    <ds:schemaRef ds:uri="http://schemas.microsoft.com/sharepoint/v3/contenttype/forms"/>
-  </ds:schemaRefs>
-</ds:datastoreItem>
-</file>
-
-<file path=customXml/itemProps27.xml><?xml version="1.0" encoding="utf-8"?>
-<ds:datastoreItem xmlns:ds="http://schemas.openxmlformats.org/officeDocument/2006/customXml" ds:itemID="{D6FEE829-2115-45B4-8110-670FD454542B}">
-  <ds:schemaRefs>
-    <ds:schemaRef ds:uri="http://schemas.microsoft.com/VisualStudio/2011/storyboarding/control"/>
-  </ds:schemaRefs>
-</ds:datastoreItem>
-</file>
-
-<file path=customXml/itemProps28.xml><?xml version="1.0" encoding="utf-8"?>
-<ds:datastoreItem xmlns:ds="http://schemas.openxmlformats.org/officeDocument/2006/customXml" ds:itemID="{5356B21E-62AB-45D9-B99D-177E6D959AE1}">
-  <ds:schemaRefs>
-    <ds:schemaRef ds:uri="http://schemas.microsoft.com/sharepoint/v3/contenttype/forms"/>
-  </ds:schemaRefs>
-</ds:datastoreItem>
-</file>
-
-<file path=customXml/itemProps29.xml><?xml version="1.0" encoding="utf-8"?>
-<ds:datastoreItem xmlns:ds="http://schemas.openxmlformats.org/officeDocument/2006/customXml" ds:itemID="{82DB428A-B8F8-483F-8276-095629A8ECDB}">
-  <ds:schemaRefs>
-    <ds:schemaRef ds:uri="http://schemas.microsoft.com/VisualStudio/2011/storyboarding/control"/>
-  </ds:schemaRefs>
-</ds:datastoreItem>
-</file>
-
-<file path=customXml/itemProps3.xml><?xml version="1.0" encoding="utf-8"?>
-<ds:datastoreItem xmlns:ds="http://schemas.openxmlformats.org/officeDocument/2006/customXml" ds:itemID="{376216F9-AF6B-4844-AE8C-B9F953F916AB}">
-  <ds:schemaRefs>
-    <ds:schemaRef ds:uri="http://schemas.microsoft.com/VisualStudio/2011/storyboarding/control"/>
-  </ds:schemaRefs>
-</ds:datastoreItem>
-</file>
-
-<file path=customXml/itemProps30.xml><?xml version="1.0" encoding="utf-8"?>
-<ds:datastoreItem xmlns:ds="http://schemas.openxmlformats.org/officeDocument/2006/customXml" ds:itemID="{1EF25EC2-965B-4491-9691-6B806C9E3B8B}">
-  <ds:schemaRefs>
-    <ds:schemaRef ds:uri="http://schemas.microsoft.com/sharepoint/v3/contenttype/forms"/>
-  </ds:schemaRefs>
-</ds:datastoreItem>
-</file>
-
-<file path=customXml/itemProps31.xml><?xml version="1.0" encoding="utf-8"?>
-<ds:datastoreItem xmlns:ds="http://schemas.openxmlformats.org/officeDocument/2006/customXml" ds:itemID="{4E8278DB-3CDD-48A7-992E-A7596AD335B9}">
-  <ds:schemaRefs>
-    <ds:schemaRef ds:uri="http://schemas.microsoft.com/VisualStudio/2011/storyboarding/control"/>
-  </ds:schemaRefs>
-</ds:datastoreItem>
-</file>
-
-<file path=customXml/itemProps32.xml><?xml version="1.0" encoding="utf-8"?>
-<ds:datastoreItem xmlns:ds="http://schemas.openxmlformats.org/officeDocument/2006/customXml" ds:itemID="{FE651ABA-5DC1-4ABD-A06E-055AE54B337B}">
-  <ds:schemaRefs>
-    <ds:schemaRef ds:uri="http://schemas.microsoft.com/VisualStudio/2011/storyboarding/control"/>
-  </ds:schemaRefs>
-</ds:datastoreItem>
-</file>
-
-<file path=customXml/itemProps33.xml><?xml version="1.0" encoding="utf-8"?>
-<ds:datastoreItem xmlns:ds="http://schemas.openxmlformats.org/officeDocument/2006/customXml" ds:itemID="{F990F116-B58F-4255-B05B-DA3808E0E5C6}">
-  <ds:schemaRefs>
-    <ds:schemaRef ds:uri="http://schemas.microsoft.com/office/2006/metadata/properties"/>
-    <ds:schemaRef ds:uri="http://schemas.microsoft.com/office/infopath/2007/PartnerControls"/>
-    <ds:schemaRef ds:uri="83cd2334-221a-48c3-9034-bfd1542dfe28"/>
-  </ds:schemaRefs>
-</ds:datastoreItem>
-</file>
-
-<file path=customXml/itemProps34.xml><?xml version="1.0" encoding="utf-8"?>
-<ds:datastoreItem xmlns:ds="http://schemas.openxmlformats.org/officeDocument/2006/customXml" ds:itemID="{B76ED3FE-E88C-4961-A59E-A34F608A3C73}">
-  <ds:schemaRefs>
-    <ds:schemaRef ds:uri="http://schemas.microsoft.com/office/2006/metadata/properties"/>
-    <ds:schemaRef ds:uri="http://schemas.microsoft.com/office/infopath/2007/PartnerControls"/>
-    <ds:schemaRef ds:uri="83cd2334-221a-48c3-9034-bfd1542dfe28"/>
-  </ds:schemaRefs>
-</ds:datastoreItem>
-</file>
-
-<file path=customXml/itemProps35.xml><?xml version="1.0" encoding="utf-8"?>
-<ds:datastoreItem xmlns:ds="http://schemas.openxmlformats.org/officeDocument/2006/customXml" ds:itemID="{432851C6-BC05-4673-B853-6D08AB80CDC4}">
-  <ds:schemaRefs>
-    <ds:schemaRef ds:uri="http://schemas.microsoft.com/VisualStudio/2011/storyboarding/control"/>
-  </ds:schemaRefs>
-</ds:datastoreItem>
-</file>
-
-<file path=customXml/itemProps36.xml><?xml version="1.0" encoding="utf-8"?>
-<ds:datastoreItem xmlns:ds="http://schemas.openxmlformats.org/officeDocument/2006/customXml" ds:itemID="{6FB9D450-4C47-4A44-8C0D-C78D8A54C46F}">
-  <ds:schemaRefs>
-    <ds:schemaRef ds:uri="http://schemas.microsoft.com/VisualStudio/2011/storyboarding/control"/>
-  </ds:schemaRefs>
-</ds:datastoreItem>
-</file>
-
-<file path=customXml/itemProps37.xml><?xml version="1.0" encoding="utf-8"?>
-<ds:datastoreItem xmlns:ds="http://schemas.openxmlformats.org/officeDocument/2006/customXml" ds:itemID="{E692D73E-1478-4790-BEEC-C5C534998F40}">
-  <ds:schemaRefs>
-    <ds:schemaRef ds:uri="http://schemas.microsoft.com/office/2006/metadata/properties"/>
-    <ds:schemaRef ds:uri="http://schemas.microsoft.com/office/infopath/2007/PartnerControls"/>
-    <ds:schemaRef ds:uri="83cd2334-221a-48c3-9034-bfd1542dfe28"/>
-  </ds:schemaRefs>
-</ds:datastoreItem>
-</file>
-
-<file path=customXml/itemProps38.xml><?xml version="1.0" encoding="utf-8"?>
-<ds:datastoreItem xmlns:ds="http://schemas.openxmlformats.org/officeDocument/2006/customXml" ds:itemID="{6304ED5A-D144-48FA-AD30-480C1D48DEBD}">
-  <ds:schemaRefs>
-    <ds:schemaRef ds:uri="http://schemas.microsoft.com/sharepoint/v3/contenttype/forms"/>
-  </ds:schemaRefs>
-</ds:datastoreItem>
-</file>
-
-<file path=customXml/itemProps39.xml><?xml version="1.0" encoding="utf-8"?>
-<ds:datastoreItem xmlns:ds="http://schemas.openxmlformats.org/officeDocument/2006/customXml" ds:itemID="{857A7473-18B7-454F-9A7C-6410FE8392A5}">
-  <ds:schemaRefs>
-    <ds:schemaRef ds:uri="http://schemas.microsoft.com/office/2006/metadata/properties"/>
-    <ds:schemaRef ds:uri="http://schemas.microsoft.com/office/infopath/2007/PartnerControls"/>
-    <ds:schemaRef ds:uri="83cd2334-221a-48c3-9034-bfd1542dfe28"/>
-  </ds:schemaRefs>
-</ds:datastoreItem>
-</file>
-
-<file path=customXml/itemProps4.xml><?xml version="1.0" encoding="utf-8"?>
-<ds:datastoreItem xmlns:ds="http://schemas.openxmlformats.org/officeDocument/2006/customXml" ds:itemID="{40746530-DDF2-4991-9C3E-4E8481CBC22A}">
-  <ds:schemaRefs>
-    <ds:schemaRef ds:uri="http://schemas.microsoft.com/office/2006/metadata/properties"/>
-    <ds:schemaRef ds:uri="http://schemas.microsoft.com/office/infopath/2007/PartnerControls"/>
-    <ds:schemaRef ds:uri="83cd2334-221a-48c3-9034-bfd1542dfe28"/>
-  </ds:schemaRefs>
-</ds:datastoreItem>
-</file>
-
-<file path=customXml/itemProps40.xml><?xml version="1.0" encoding="utf-8"?>
-<ds:datastoreItem xmlns:ds="http://schemas.openxmlformats.org/officeDocument/2006/customXml" ds:itemID="{21F6B647-976A-41D0-B760-9DF9DFC6AE3C}">
-  <ds:schemaRefs>
-    <ds:schemaRef ds:uri="http://schemas.microsoft.com/VisualStudio/2011/storyboarding/control"/>
-  </ds:schemaRefs>
-</ds:datastoreItem>
-</file>
-
-<file path=customXml/itemProps41.xml><?xml version="1.0" encoding="utf-8"?>
-<ds:datastoreItem xmlns:ds="http://schemas.openxmlformats.org/officeDocument/2006/customXml" ds:itemID="{D4B5F268-5930-44CD-BDF1-D0A04D4BBC1C}">
-  <ds:schemaRefs>
-    <ds:schemaRef ds:uri="http://schemas.microsoft.com/VisualStudio/2011/storyboarding/control"/>
-  </ds:schemaRefs>
-</ds:datastoreItem>
-</file>
-
-<file path=customXml/itemProps42.xml><?xml version="1.0" encoding="utf-8"?>
-<ds:datastoreItem xmlns:ds="http://schemas.openxmlformats.org/officeDocument/2006/customXml" ds:itemID="{8257D6BC-B71E-4D95-81E4-A1D4A8174168}">
-  <ds:schemaRefs>
-    <ds:schemaRef ds:uri="http://schemas.microsoft.com/VisualStudio/2011/storyboarding/control"/>
-  </ds:schemaRefs>
-</ds:datastoreItem>
-</file>
-
-<file path=customXml/itemProps43.xml><?xml version="1.0" encoding="utf-8"?>
-<ds:datastoreItem xmlns:ds="http://schemas.openxmlformats.org/officeDocument/2006/customXml" ds:itemID="{4B608A51-347D-40FD-BFCF-C0BBBB6DE38F}">
-  <ds:schemaRefs>
-    <ds:schemaRef ds:uri="http://schemas.microsoft.com/sharepoint/v3/contenttype/forms"/>
-  </ds:schemaRefs>
-</ds:datastoreItem>
-</file>
-
-<file path=customXml/itemProps44.xml><?xml version="1.0" encoding="utf-8"?>
-<ds:datastoreItem xmlns:ds="http://schemas.openxmlformats.org/officeDocument/2006/customXml" ds:itemID="{18966F1F-DC2A-460D-B918-D3DF54AC7FCE}">
-  <ds:schemaRefs>
-    <ds:schemaRef ds:uri="http://schemas.microsoft.com/office/2006/metadata/properties"/>
-    <ds:schemaRef ds:uri="http://schemas.microsoft.com/office/infopath/2007/PartnerControls"/>
-    <ds:schemaRef ds:uri="83cd2334-221a-48c3-9034-bfd1542dfe28"/>
-  </ds:schemaRefs>
-</ds:datastoreItem>
-</file>
-
-<file path=customXml/itemProps45.xml><?xml version="1.0" encoding="utf-8"?>
-<ds:datastoreItem xmlns:ds="http://schemas.openxmlformats.org/officeDocument/2006/customXml" ds:itemID="{4E805D65-1532-4BB0-8F41-8013167C0009}">
-  <ds:schemaRefs>
-    <ds:schemaRef ds:uri="http://schemas.microsoft.com/VisualStudio/2011/storyboarding/control"/>
-  </ds:schemaRefs>
-</ds:datastoreItem>
-</file>
-
-<file path=customXml/itemProps46.xml><?xml version="1.0" encoding="utf-8"?>
-<ds:datastoreItem xmlns:ds="http://schemas.openxmlformats.org/officeDocument/2006/customXml" ds:itemID="{7959CC6A-F423-4783-B968-3BCC86A7394E}">
-  <ds:schemaRefs>
-    <ds:schemaRef ds:uri="http://schemas.microsoft.com/VisualStudio/2011/storyboarding/control"/>
-  </ds:schemaRefs>
-</ds:datastoreItem>
-</file>
-
-<file path=customXml/itemProps47.xml><?xml version="1.0" encoding="utf-8"?>
-<ds:datastoreItem xmlns:ds="http://schemas.openxmlformats.org/officeDocument/2006/customXml" ds:itemID="{0B54C583-7BAB-4080-8093-C5F84F5A225A}">
-  <ds:schemaRefs>
-    <ds:schemaRef ds:uri="http://schemas.microsoft.com/VisualStudio/2011/storyboarding/control"/>
-  </ds:schemaRefs>
-</ds:datastoreItem>
-</file>
-
-<file path=customXml/itemProps5.xml><?xml version="1.0" encoding="utf-8"?>
-<ds:datastoreItem xmlns:ds="http://schemas.openxmlformats.org/officeDocument/2006/customXml" ds:itemID="{758FDAC0-319D-4A54-8D8E-1D42CB1F8004}">
-  <ds:schemaRefs>
-    <ds:schemaRef ds:uri="http://schemas.microsoft.com/sharepoint/v3/contenttype/forms"/>
-  </ds:schemaRefs>
-</ds:datastoreItem>
-</file>
-
-<file path=customXml/itemProps6.xml><?xml version="1.0" encoding="utf-8"?>
-<ds:datastoreItem xmlns:ds="http://schemas.openxmlformats.org/officeDocument/2006/customXml" ds:itemID="{9360AFB9-8F99-4E1B-878D-F2EBABEB164C}">
-  <ds:schemaRefs>
-    <ds:schemaRef ds:uri="http://schemas.microsoft.com/sharepoint/v3/contenttype/forms"/>
-  </ds:schemaRefs>
-</ds:datastoreItem>
-</file>
-
-<file path=customXml/itemProps7.xml><?xml version="1.0" encoding="utf-8"?>
-<ds:datastoreItem xmlns:ds="http://schemas.openxmlformats.org/officeDocument/2006/customXml" ds:itemID="{473A6A21-7521-4B81-9336-9B587BA12275}">
-  <ds:schemaRefs>
-    <ds:schemaRef ds:uri="http://schemas.microsoft.com/office/2006/metadata/properties"/>
-    <ds:schemaRef ds:uri="http://schemas.microsoft.com/office/infopath/2007/PartnerControls"/>
-    <ds:schemaRef ds:uri="83cd2334-221a-48c3-9034-bfd1542dfe28"/>
-  </ds:schemaRefs>
-</ds:datastoreItem>
-</file>
-
-<file path=customXml/itemProps8.xml><?xml version="1.0" encoding="utf-8"?>
-<ds:datastoreItem xmlns:ds="http://schemas.openxmlformats.org/officeDocument/2006/customXml" ds:itemID="{38217AA1-CC95-49A9-B284-2ED4D347D7CA}">
-  <ds:schemaRefs>
-    <ds:schemaRef ds:uri="http://schemas.microsoft.com/VisualStudio/2011/storyboarding/control"/>
-  </ds:schemaRefs>
-</ds:datastoreItem>
-</file>
-
 <file path=customXml/itemProps9.xml><?xml version="1.0" encoding="utf-8"?>
-<ds:datastoreItem xmlns:ds="http://schemas.openxmlformats.org/officeDocument/2006/customXml" ds:itemID="{8893E80D-6D0C-4E0F-AA22-E5615BB87E5B}">
+<ds:datastoreItem xmlns:ds="http://schemas.openxmlformats.org/officeDocument/2006/customXml" ds:itemID="{C63AC2F0-1DEB-4E91-A88A-7A014A172F4F}">
   <ds:schemaRefs>
     <ds:schemaRef ds:uri="http://schemas.microsoft.com/VisualStudio/2011/storyboarding/control"/>
   </ds:schemaRefs>

</xml_diff>